<commit_message>
updated lesson 2 slides
</commit_message>
<xml_diff>
--- a/Lessons/Lesson2.pptx
+++ b/Lessons/Lesson2.pptx
@@ -4,16 +4,30 @@
   <p:sldMasterIdLst>
     <p:sldMasterId id="2147483648" r:id="rId1"/>
   </p:sldMasterIdLst>
+  <p:notesMasterIdLst>
+    <p:notesMasterId r:id="rId22"/>
+  </p:notesMasterIdLst>
   <p:sldIdLst>
     <p:sldId id="256" r:id="rId2"/>
     <p:sldId id="257" r:id="rId3"/>
     <p:sldId id="261" r:id="rId4"/>
     <p:sldId id="262" r:id="rId5"/>
-    <p:sldId id="263" r:id="rId6"/>
-    <p:sldId id="264" r:id="rId7"/>
-    <p:sldId id="260" r:id="rId8"/>
-    <p:sldId id="258" r:id="rId9"/>
-    <p:sldId id="259" r:id="rId10"/>
+    <p:sldId id="265" r:id="rId6"/>
+    <p:sldId id="266" r:id="rId7"/>
+    <p:sldId id="267" r:id="rId8"/>
+    <p:sldId id="268" r:id="rId9"/>
+    <p:sldId id="269" r:id="rId10"/>
+    <p:sldId id="271" r:id="rId11"/>
+    <p:sldId id="272" r:id="rId12"/>
+    <p:sldId id="277" r:id="rId13"/>
+    <p:sldId id="274" r:id="rId14"/>
+    <p:sldId id="275" r:id="rId15"/>
+    <p:sldId id="276" r:id="rId16"/>
+    <p:sldId id="270" r:id="rId17"/>
+    <p:sldId id="278" r:id="rId18"/>
+    <p:sldId id="263" r:id="rId19"/>
+    <p:sldId id="264" r:id="rId20"/>
+    <p:sldId id="258" r:id="rId21"/>
   </p:sldIdLst>
   <p:sldSz cx="12192000" cy="6858000"/>
   <p:notesSz cx="6858000" cy="9144000"/>
@@ -112,7 +126,730 @@
       </a:defRPr>
     </a:lvl9pPr>
   </p:defaultTextStyle>
+  <p:extLst>
+    <p:ext uri="{EFAFB233-063F-42B5-8137-9DF3F51BA10A}">
+      <p15:sldGuideLst xmlns:p15="http://schemas.microsoft.com/office/powerpoint/2012/main"/>
+    </p:ext>
+  </p:extLst>
 </p:presentation>
+</file>
+
+<file path=ppt/notesMasters/notesMaster1.xml><?xml version="1.0" encoding="utf-8"?>
+<p:notesMaster xmlns:a="http://schemas.openxmlformats.org/drawingml/2006/main" xmlns:r="http://schemas.openxmlformats.org/officeDocument/2006/relationships" xmlns:p="http://schemas.openxmlformats.org/presentationml/2006/main">
+  <p:cSld>
+    <p:bg>
+      <p:bgRef idx="1001">
+        <a:schemeClr val="bg1"/>
+      </p:bgRef>
+    </p:bg>
+    <p:spTree>
+      <p:nvGrpSpPr>
+        <p:cNvPr id="1" name=""/>
+        <p:cNvGrpSpPr/>
+        <p:nvPr/>
+      </p:nvGrpSpPr>
+      <p:grpSpPr>
+        <a:xfrm>
+          <a:off x="0" y="0"/>
+          <a:ext cx="0" cy="0"/>
+          <a:chOff x="0" y="0"/>
+          <a:chExt cx="0" cy="0"/>
+        </a:xfrm>
+      </p:grpSpPr>
+      <p:sp>
+        <p:nvSpPr>
+          <p:cNvPr id="2" name="Header Placeholder 1"/>
+          <p:cNvSpPr>
+            <a:spLocks noGrp="1"/>
+          </p:cNvSpPr>
+          <p:nvPr>
+            <p:ph type="hdr" sz="quarter"/>
+          </p:nvPr>
+        </p:nvSpPr>
+        <p:spPr>
+          <a:xfrm>
+            <a:off x="0" y="0"/>
+            <a:ext cx="2971800" cy="458788"/>
+          </a:xfrm>
+          <a:prstGeom prst="rect">
+            <a:avLst/>
+          </a:prstGeom>
+        </p:spPr>
+        <p:txBody>
+          <a:bodyPr vert="horz" lIns="91440" tIns="45720" rIns="91440" bIns="45720" rtlCol="0"/>
+          <a:lstStyle>
+            <a:lvl1pPr algn="l">
+              <a:defRPr sz="1200"/>
+            </a:lvl1pPr>
+          </a:lstStyle>
+          <a:p>
+            <a:endParaRPr lang="en-US"/>
+          </a:p>
+        </p:txBody>
+      </p:sp>
+      <p:sp>
+        <p:nvSpPr>
+          <p:cNvPr id="3" name="Date Placeholder 2"/>
+          <p:cNvSpPr>
+            <a:spLocks noGrp="1"/>
+          </p:cNvSpPr>
+          <p:nvPr>
+            <p:ph type="dt" idx="1"/>
+          </p:nvPr>
+        </p:nvSpPr>
+        <p:spPr>
+          <a:xfrm>
+            <a:off x="3884613" y="0"/>
+            <a:ext cx="2971800" cy="458788"/>
+          </a:xfrm>
+          <a:prstGeom prst="rect">
+            <a:avLst/>
+          </a:prstGeom>
+        </p:spPr>
+        <p:txBody>
+          <a:bodyPr vert="horz" lIns="91440" tIns="45720" rIns="91440" bIns="45720" rtlCol="0"/>
+          <a:lstStyle>
+            <a:lvl1pPr algn="r">
+              <a:defRPr sz="1200"/>
+            </a:lvl1pPr>
+          </a:lstStyle>
+          <a:p>
+            <a:fld id="{CF2B96EE-A88A-4F53-824F-757220476D78}" type="datetimeFigureOut">
+              <a:rPr lang="en-US" smtClean="0"/>
+              <a:t>11/5/2018</a:t>
+            </a:fld>
+            <a:endParaRPr lang="en-US"/>
+          </a:p>
+        </p:txBody>
+      </p:sp>
+      <p:sp>
+        <p:nvSpPr>
+          <p:cNvPr id="4" name="Slide Image Placeholder 3"/>
+          <p:cNvSpPr>
+            <a:spLocks noGrp="1" noRot="1" noChangeAspect="1"/>
+          </p:cNvSpPr>
+          <p:nvPr>
+            <p:ph type="sldImg" idx="2"/>
+          </p:nvPr>
+        </p:nvSpPr>
+        <p:spPr>
+          <a:xfrm>
+            <a:off x="685800" y="1143000"/>
+            <a:ext cx="5486400" cy="3086100"/>
+          </a:xfrm>
+          <a:prstGeom prst="rect">
+            <a:avLst/>
+          </a:prstGeom>
+          <a:noFill/>
+          <a:ln w="12700">
+            <a:solidFill>
+              <a:prstClr val="black"/>
+            </a:solidFill>
+          </a:ln>
+        </p:spPr>
+        <p:txBody>
+          <a:bodyPr vert="horz" lIns="91440" tIns="45720" rIns="91440" bIns="45720" rtlCol="0" anchor="ctr"/>
+          <a:lstStyle/>
+          <a:p>
+            <a:endParaRPr lang="en-US"/>
+          </a:p>
+        </p:txBody>
+      </p:sp>
+      <p:sp>
+        <p:nvSpPr>
+          <p:cNvPr id="5" name="Notes Placeholder 4"/>
+          <p:cNvSpPr>
+            <a:spLocks noGrp="1"/>
+          </p:cNvSpPr>
+          <p:nvPr>
+            <p:ph type="body" sz="quarter" idx="3"/>
+          </p:nvPr>
+        </p:nvSpPr>
+        <p:spPr>
+          <a:xfrm>
+            <a:off x="685800" y="4400550"/>
+            <a:ext cx="5486400" cy="3600450"/>
+          </a:xfrm>
+          <a:prstGeom prst="rect">
+            <a:avLst/>
+          </a:prstGeom>
+        </p:spPr>
+        <p:txBody>
+          <a:bodyPr vert="horz" lIns="91440" tIns="45720" rIns="91440" bIns="45720" rtlCol="0"/>
+          <a:lstStyle/>
+          <a:p>
+            <a:pPr lvl="0"/>
+            <a:r>
+              <a:rPr lang="en-US"/>
+              <a:t>Edit Master text styles</a:t>
+            </a:r>
+          </a:p>
+          <a:p>
+            <a:pPr lvl="1"/>
+            <a:r>
+              <a:rPr lang="en-US"/>
+              <a:t>Second level</a:t>
+            </a:r>
+          </a:p>
+          <a:p>
+            <a:pPr lvl="2"/>
+            <a:r>
+              <a:rPr lang="en-US"/>
+              <a:t>Third level</a:t>
+            </a:r>
+          </a:p>
+          <a:p>
+            <a:pPr lvl="3"/>
+            <a:r>
+              <a:rPr lang="en-US"/>
+              <a:t>Fourth level</a:t>
+            </a:r>
+          </a:p>
+          <a:p>
+            <a:pPr lvl="4"/>
+            <a:r>
+              <a:rPr lang="en-US"/>
+              <a:t>Fifth level</a:t>
+            </a:r>
+          </a:p>
+        </p:txBody>
+      </p:sp>
+      <p:sp>
+        <p:nvSpPr>
+          <p:cNvPr id="6" name="Footer Placeholder 5"/>
+          <p:cNvSpPr>
+            <a:spLocks noGrp="1"/>
+          </p:cNvSpPr>
+          <p:nvPr>
+            <p:ph type="ftr" sz="quarter" idx="4"/>
+          </p:nvPr>
+        </p:nvSpPr>
+        <p:spPr>
+          <a:xfrm>
+            <a:off x="0" y="8685213"/>
+            <a:ext cx="2971800" cy="458787"/>
+          </a:xfrm>
+          <a:prstGeom prst="rect">
+            <a:avLst/>
+          </a:prstGeom>
+        </p:spPr>
+        <p:txBody>
+          <a:bodyPr vert="horz" lIns="91440" tIns="45720" rIns="91440" bIns="45720" rtlCol="0" anchor="b"/>
+          <a:lstStyle>
+            <a:lvl1pPr algn="l">
+              <a:defRPr sz="1200"/>
+            </a:lvl1pPr>
+          </a:lstStyle>
+          <a:p>
+            <a:endParaRPr lang="en-US"/>
+          </a:p>
+        </p:txBody>
+      </p:sp>
+      <p:sp>
+        <p:nvSpPr>
+          <p:cNvPr id="7" name="Slide Number Placeholder 6"/>
+          <p:cNvSpPr>
+            <a:spLocks noGrp="1"/>
+          </p:cNvSpPr>
+          <p:nvPr>
+            <p:ph type="sldNum" sz="quarter" idx="5"/>
+          </p:nvPr>
+        </p:nvSpPr>
+        <p:spPr>
+          <a:xfrm>
+            <a:off x="3884613" y="8685213"/>
+            <a:ext cx="2971800" cy="458787"/>
+          </a:xfrm>
+          <a:prstGeom prst="rect">
+            <a:avLst/>
+          </a:prstGeom>
+        </p:spPr>
+        <p:txBody>
+          <a:bodyPr vert="horz" lIns="91440" tIns="45720" rIns="91440" bIns="45720" rtlCol="0" anchor="b"/>
+          <a:lstStyle>
+            <a:lvl1pPr algn="r">
+              <a:defRPr sz="1200"/>
+            </a:lvl1pPr>
+          </a:lstStyle>
+          <a:p>
+            <a:fld id="{AB4F6275-0E25-4E4E-99DE-2002C9C04F42}" type="slidenum">
+              <a:rPr lang="en-US" smtClean="0"/>
+              <a:t>‹#›</a:t>
+            </a:fld>
+            <a:endParaRPr lang="en-US"/>
+          </a:p>
+        </p:txBody>
+      </p:sp>
+    </p:spTree>
+    <p:extLst>
+      <p:ext uri="{BB962C8B-B14F-4D97-AF65-F5344CB8AC3E}">
+        <p14:creationId xmlns:p14="http://schemas.microsoft.com/office/powerpoint/2010/main" val="804802426"/>
+      </p:ext>
+    </p:extLst>
+  </p:cSld>
+  <p:clrMap bg1="lt1" tx1="dk1" bg2="lt2" tx2="dk2" accent1="accent1" accent2="accent2" accent3="accent3" accent4="accent4" accent5="accent5" accent6="accent6" hlink="hlink" folHlink="folHlink"/>
+  <p:notesStyle>
+    <a:lvl1pPr marL="0" algn="l" defTabSz="914400" rtl="0" eaLnBrk="1" latinLnBrk="0" hangingPunct="1">
+      <a:defRPr sz="1200" kern="1200">
+        <a:solidFill>
+          <a:schemeClr val="tx1"/>
+        </a:solidFill>
+        <a:latin typeface="+mn-lt"/>
+        <a:ea typeface="+mn-ea"/>
+        <a:cs typeface="+mn-cs"/>
+      </a:defRPr>
+    </a:lvl1pPr>
+    <a:lvl2pPr marL="457200" algn="l" defTabSz="914400" rtl="0" eaLnBrk="1" latinLnBrk="0" hangingPunct="1">
+      <a:defRPr sz="1200" kern="1200">
+        <a:solidFill>
+          <a:schemeClr val="tx1"/>
+        </a:solidFill>
+        <a:latin typeface="+mn-lt"/>
+        <a:ea typeface="+mn-ea"/>
+        <a:cs typeface="+mn-cs"/>
+      </a:defRPr>
+    </a:lvl2pPr>
+    <a:lvl3pPr marL="914400" algn="l" defTabSz="914400" rtl="0" eaLnBrk="1" latinLnBrk="0" hangingPunct="1">
+      <a:defRPr sz="1200" kern="1200">
+        <a:solidFill>
+          <a:schemeClr val="tx1"/>
+        </a:solidFill>
+        <a:latin typeface="+mn-lt"/>
+        <a:ea typeface="+mn-ea"/>
+        <a:cs typeface="+mn-cs"/>
+      </a:defRPr>
+    </a:lvl3pPr>
+    <a:lvl4pPr marL="1371600" algn="l" defTabSz="914400" rtl="0" eaLnBrk="1" latinLnBrk="0" hangingPunct="1">
+      <a:defRPr sz="1200" kern="1200">
+        <a:solidFill>
+          <a:schemeClr val="tx1"/>
+        </a:solidFill>
+        <a:latin typeface="+mn-lt"/>
+        <a:ea typeface="+mn-ea"/>
+        <a:cs typeface="+mn-cs"/>
+      </a:defRPr>
+    </a:lvl4pPr>
+    <a:lvl5pPr marL="1828800" algn="l" defTabSz="914400" rtl="0" eaLnBrk="1" latinLnBrk="0" hangingPunct="1">
+      <a:defRPr sz="1200" kern="1200">
+        <a:solidFill>
+          <a:schemeClr val="tx1"/>
+        </a:solidFill>
+        <a:latin typeface="+mn-lt"/>
+        <a:ea typeface="+mn-ea"/>
+        <a:cs typeface="+mn-cs"/>
+      </a:defRPr>
+    </a:lvl5pPr>
+    <a:lvl6pPr marL="2286000" algn="l" defTabSz="914400" rtl="0" eaLnBrk="1" latinLnBrk="0" hangingPunct="1">
+      <a:defRPr sz="1200" kern="1200">
+        <a:solidFill>
+          <a:schemeClr val="tx1"/>
+        </a:solidFill>
+        <a:latin typeface="+mn-lt"/>
+        <a:ea typeface="+mn-ea"/>
+        <a:cs typeface="+mn-cs"/>
+      </a:defRPr>
+    </a:lvl6pPr>
+    <a:lvl7pPr marL="2743200" algn="l" defTabSz="914400" rtl="0" eaLnBrk="1" latinLnBrk="0" hangingPunct="1">
+      <a:defRPr sz="1200" kern="1200">
+        <a:solidFill>
+          <a:schemeClr val="tx1"/>
+        </a:solidFill>
+        <a:latin typeface="+mn-lt"/>
+        <a:ea typeface="+mn-ea"/>
+        <a:cs typeface="+mn-cs"/>
+      </a:defRPr>
+    </a:lvl7pPr>
+    <a:lvl8pPr marL="3200400" algn="l" defTabSz="914400" rtl="0" eaLnBrk="1" latinLnBrk="0" hangingPunct="1">
+      <a:defRPr sz="1200" kern="1200">
+        <a:solidFill>
+          <a:schemeClr val="tx1"/>
+        </a:solidFill>
+        <a:latin typeface="+mn-lt"/>
+        <a:ea typeface="+mn-ea"/>
+        <a:cs typeface="+mn-cs"/>
+      </a:defRPr>
+    </a:lvl8pPr>
+    <a:lvl9pPr marL="3657600" algn="l" defTabSz="914400" rtl="0" eaLnBrk="1" latinLnBrk="0" hangingPunct="1">
+      <a:defRPr sz="1200" kern="1200">
+        <a:solidFill>
+          <a:schemeClr val="tx1"/>
+        </a:solidFill>
+        <a:latin typeface="+mn-lt"/>
+        <a:ea typeface="+mn-ea"/>
+        <a:cs typeface="+mn-cs"/>
+      </a:defRPr>
+    </a:lvl9pPr>
+  </p:notesStyle>
+</p:notesMaster>
+</file>
+
+<file path=ppt/notesSlides/notesSlide1.xml><?xml version="1.0" encoding="utf-8"?>
+<p:notes xmlns:a="http://schemas.openxmlformats.org/drawingml/2006/main" xmlns:r="http://schemas.openxmlformats.org/officeDocument/2006/relationships" xmlns:p="http://schemas.openxmlformats.org/presentationml/2006/main">
+  <p:cSld>
+    <p:spTree>
+      <p:nvGrpSpPr>
+        <p:cNvPr id="1" name=""/>
+        <p:cNvGrpSpPr/>
+        <p:nvPr/>
+      </p:nvGrpSpPr>
+      <p:grpSpPr>
+        <a:xfrm>
+          <a:off x="0" y="0"/>
+          <a:ext cx="0" cy="0"/>
+          <a:chOff x="0" y="0"/>
+          <a:chExt cx="0" cy="0"/>
+        </a:xfrm>
+      </p:grpSpPr>
+      <p:sp>
+        <p:nvSpPr>
+          <p:cNvPr id="2" name="Slide Image Placeholder 1"/>
+          <p:cNvSpPr>
+            <a:spLocks noGrp="1" noRot="1" noChangeAspect="1"/>
+          </p:cNvSpPr>
+          <p:nvPr>
+            <p:ph type="sldImg"/>
+          </p:nvPr>
+        </p:nvSpPr>
+        <p:spPr/>
+      </p:sp>
+      <p:sp>
+        <p:nvSpPr>
+          <p:cNvPr id="3" name="Notes Placeholder 2"/>
+          <p:cNvSpPr>
+            <a:spLocks noGrp="1"/>
+          </p:cNvSpPr>
+          <p:nvPr>
+            <p:ph type="body" idx="1"/>
+          </p:nvPr>
+        </p:nvSpPr>
+        <p:spPr/>
+        <p:txBody>
+          <a:bodyPr/>
+          <a:lstStyle/>
+          <a:p>
+            <a:r>
+              <a:rPr lang="en-US" dirty="0"/>
+              <a:t>And how does it improve upon the initial predictions that it has made; before we go into that, I need to go over a few more key principles</a:t>
+            </a:r>
+          </a:p>
+        </p:txBody>
+      </p:sp>
+      <p:sp>
+        <p:nvSpPr>
+          <p:cNvPr id="4" name="Slide Number Placeholder 3"/>
+          <p:cNvSpPr>
+            <a:spLocks noGrp="1"/>
+          </p:cNvSpPr>
+          <p:nvPr>
+            <p:ph type="sldNum" sz="quarter" idx="5"/>
+          </p:nvPr>
+        </p:nvSpPr>
+        <p:spPr/>
+        <p:txBody>
+          <a:bodyPr/>
+          <a:lstStyle/>
+          <a:p>
+            <a:fld id="{AB4F6275-0E25-4E4E-99DE-2002C9C04F42}" type="slidenum">
+              <a:rPr lang="en-US" smtClean="0"/>
+              <a:t>4</a:t>
+            </a:fld>
+            <a:endParaRPr lang="en-US"/>
+          </a:p>
+        </p:txBody>
+      </p:sp>
+    </p:spTree>
+    <p:extLst>
+      <p:ext uri="{BB962C8B-B14F-4D97-AF65-F5344CB8AC3E}">
+        <p14:creationId xmlns:p14="http://schemas.microsoft.com/office/powerpoint/2010/main" val="4056982469"/>
+      </p:ext>
+    </p:extLst>
+  </p:cSld>
+  <p:clrMapOvr>
+    <a:masterClrMapping/>
+  </p:clrMapOvr>
+</p:notes>
+</file>
+
+<file path=ppt/notesSlides/notesSlide2.xml><?xml version="1.0" encoding="utf-8"?>
+<p:notes xmlns:a="http://schemas.openxmlformats.org/drawingml/2006/main" xmlns:r="http://schemas.openxmlformats.org/officeDocument/2006/relationships" xmlns:p="http://schemas.openxmlformats.org/presentationml/2006/main">
+  <p:cSld>
+    <p:spTree>
+      <p:nvGrpSpPr>
+        <p:cNvPr id="1" name=""/>
+        <p:cNvGrpSpPr/>
+        <p:nvPr/>
+      </p:nvGrpSpPr>
+      <p:grpSpPr>
+        <a:xfrm>
+          <a:off x="0" y="0"/>
+          <a:ext cx="0" cy="0"/>
+          <a:chOff x="0" y="0"/>
+          <a:chExt cx="0" cy="0"/>
+        </a:xfrm>
+      </p:grpSpPr>
+      <p:sp>
+        <p:nvSpPr>
+          <p:cNvPr id="2" name="Slide Image Placeholder 1"/>
+          <p:cNvSpPr>
+            <a:spLocks noGrp="1" noRot="1" noChangeAspect="1"/>
+          </p:cNvSpPr>
+          <p:nvPr>
+            <p:ph type="sldImg"/>
+          </p:nvPr>
+        </p:nvSpPr>
+        <p:spPr/>
+      </p:sp>
+      <p:sp>
+        <p:nvSpPr>
+          <p:cNvPr id="3" name="Notes Placeholder 2"/>
+          <p:cNvSpPr>
+            <a:spLocks noGrp="1"/>
+          </p:cNvSpPr>
+          <p:nvPr>
+            <p:ph type="body" idx="1"/>
+          </p:nvPr>
+        </p:nvSpPr>
+        <p:spPr/>
+        <p:txBody>
+          <a:bodyPr/>
+          <a:lstStyle/>
+          <a:p>
+            <a:r>
+              <a:rPr lang="en-US" dirty="0"/>
+              <a:t>Next aspect we should cover is an elaboration of the Iteration; epoch and training batch</a:t>
+            </a:r>
+          </a:p>
+          <a:p>
+            <a:r>
+              <a:rPr lang="en-US" dirty="0"/>
+              <a:t>Training batch is 2^n; n = 4..8</a:t>
+            </a:r>
+          </a:p>
+        </p:txBody>
+      </p:sp>
+      <p:sp>
+        <p:nvSpPr>
+          <p:cNvPr id="4" name="Slide Number Placeholder 3"/>
+          <p:cNvSpPr>
+            <a:spLocks noGrp="1"/>
+          </p:cNvSpPr>
+          <p:nvPr>
+            <p:ph type="sldNum" sz="quarter" idx="5"/>
+          </p:nvPr>
+        </p:nvSpPr>
+        <p:spPr/>
+        <p:txBody>
+          <a:bodyPr/>
+          <a:lstStyle/>
+          <a:p>
+            <a:fld id="{AB4F6275-0E25-4E4E-99DE-2002C9C04F42}" type="slidenum">
+              <a:rPr lang="en-US" smtClean="0"/>
+              <a:t>6</a:t>
+            </a:fld>
+            <a:endParaRPr lang="en-US"/>
+          </a:p>
+        </p:txBody>
+      </p:sp>
+    </p:spTree>
+    <p:extLst>
+      <p:ext uri="{BB962C8B-B14F-4D97-AF65-F5344CB8AC3E}">
+        <p14:creationId xmlns:p14="http://schemas.microsoft.com/office/powerpoint/2010/main" val="1260871852"/>
+      </p:ext>
+    </p:extLst>
+  </p:cSld>
+  <p:clrMapOvr>
+    <a:masterClrMapping/>
+  </p:clrMapOvr>
+</p:notes>
+</file>
+
+<file path=ppt/notesSlides/notesSlide3.xml><?xml version="1.0" encoding="utf-8"?>
+<p:notes xmlns:a="http://schemas.openxmlformats.org/drawingml/2006/main" xmlns:r="http://schemas.openxmlformats.org/officeDocument/2006/relationships" xmlns:p="http://schemas.openxmlformats.org/presentationml/2006/main">
+  <p:cSld>
+    <p:spTree>
+      <p:nvGrpSpPr>
+        <p:cNvPr id="1" name=""/>
+        <p:cNvGrpSpPr/>
+        <p:nvPr/>
+      </p:nvGrpSpPr>
+      <p:grpSpPr>
+        <a:xfrm>
+          <a:off x="0" y="0"/>
+          <a:ext cx="0" cy="0"/>
+          <a:chOff x="0" y="0"/>
+          <a:chExt cx="0" cy="0"/>
+        </a:xfrm>
+      </p:grpSpPr>
+      <p:sp>
+        <p:nvSpPr>
+          <p:cNvPr id="2" name="Slide Image Placeholder 1"/>
+          <p:cNvSpPr>
+            <a:spLocks noGrp="1" noRot="1" noChangeAspect="1"/>
+          </p:cNvSpPr>
+          <p:nvPr>
+            <p:ph type="sldImg"/>
+          </p:nvPr>
+        </p:nvSpPr>
+        <p:spPr/>
+      </p:sp>
+      <p:sp>
+        <p:nvSpPr>
+          <p:cNvPr id="3" name="Notes Placeholder 2"/>
+          <p:cNvSpPr>
+            <a:spLocks noGrp="1"/>
+          </p:cNvSpPr>
+          <p:nvPr>
+            <p:ph type="body" idx="1"/>
+          </p:nvPr>
+        </p:nvSpPr>
+        <p:spPr/>
+        <p:txBody>
+          <a:bodyPr/>
+          <a:lstStyle/>
+          <a:p>
+            <a:r>
+              <a:rPr lang="en-US" dirty="0"/>
+              <a:t>10 training examples, first would be used as input, once done, it will go to next value and so on</a:t>
+            </a:r>
+          </a:p>
+          <a:p>
+            <a:r>
+              <a:rPr lang="en-US" dirty="0"/>
+              <a:t>Without training batches, updates for learning would occur at the end of an epoch, We will explain later why this is in ideal</a:t>
+            </a:r>
+          </a:p>
+          <a:p>
+            <a:r>
+              <a:rPr lang="en-US" dirty="0"/>
+              <a:t>Conversely, using training batches allows for more frequent updates, maybe after 25% of training data has been seen.</a:t>
+            </a:r>
+          </a:p>
+          <a:p>
+            <a:endParaRPr lang="en-US" dirty="0"/>
+          </a:p>
+        </p:txBody>
+      </p:sp>
+      <p:sp>
+        <p:nvSpPr>
+          <p:cNvPr id="4" name="Slide Number Placeholder 3"/>
+          <p:cNvSpPr>
+            <a:spLocks noGrp="1"/>
+          </p:cNvSpPr>
+          <p:nvPr>
+            <p:ph type="sldNum" sz="quarter" idx="5"/>
+          </p:nvPr>
+        </p:nvSpPr>
+        <p:spPr/>
+        <p:txBody>
+          <a:bodyPr/>
+          <a:lstStyle/>
+          <a:p>
+            <a:fld id="{AB4F6275-0E25-4E4E-99DE-2002C9C04F42}" type="slidenum">
+              <a:rPr lang="en-US" smtClean="0"/>
+              <a:t>7</a:t>
+            </a:fld>
+            <a:endParaRPr lang="en-US"/>
+          </a:p>
+        </p:txBody>
+      </p:sp>
+    </p:spTree>
+    <p:extLst>
+      <p:ext uri="{BB962C8B-B14F-4D97-AF65-F5344CB8AC3E}">
+        <p14:creationId xmlns:p14="http://schemas.microsoft.com/office/powerpoint/2010/main" val="597287270"/>
+      </p:ext>
+    </p:extLst>
+  </p:cSld>
+  <p:clrMapOvr>
+    <a:masterClrMapping/>
+  </p:clrMapOvr>
+</p:notes>
+</file>
+
+<file path=ppt/notesSlides/notesSlide4.xml><?xml version="1.0" encoding="utf-8"?>
+<p:notes xmlns:a="http://schemas.openxmlformats.org/drawingml/2006/main" xmlns:r="http://schemas.openxmlformats.org/officeDocument/2006/relationships" xmlns:p="http://schemas.openxmlformats.org/presentationml/2006/main">
+  <p:cSld>
+    <p:spTree>
+      <p:nvGrpSpPr>
+        <p:cNvPr id="1" name=""/>
+        <p:cNvGrpSpPr/>
+        <p:nvPr/>
+      </p:nvGrpSpPr>
+      <p:grpSpPr>
+        <a:xfrm>
+          <a:off x="0" y="0"/>
+          <a:ext cx="0" cy="0"/>
+          <a:chOff x="0" y="0"/>
+          <a:chExt cx="0" cy="0"/>
+        </a:xfrm>
+      </p:grpSpPr>
+      <p:sp>
+        <p:nvSpPr>
+          <p:cNvPr id="2" name="Slide Image Placeholder 1"/>
+          <p:cNvSpPr>
+            <a:spLocks noGrp="1" noRot="1" noChangeAspect="1"/>
+          </p:cNvSpPr>
+          <p:nvPr>
+            <p:ph type="sldImg"/>
+          </p:nvPr>
+        </p:nvSpPr>
+        <p:spPr/>
+      </p:sp>
+      <p:sp>
+        <p:nvSpPr>
+          <p:cNvPr id="3" name="Notes Placeholder 2"/>
+          <p:cNvSpPr>
+            <a:spLocks noGrp="1"/>
+          </p:cNvSpPr>
+          <p:nvPr>
+            <p:ph type="body" idx="1"/>
+          </p:nvPr>
+        </p:nvSpPr>
+        <p:spPr/>
+        <p:txBody>
+          <a:bodyPr/>
+          <a:lstStyle/>
+          <a:p>
+            <a:r>
+              <a:rPr lang="en-US" dirty="0"/>
+              <a:t>Here I will give a relatively simplistic over view of cost and loss and how that applies to learning, for a comprehensive understanding, refer to resources mentioned at end of presentation.</a:t>
+            </a:r>
+          </a:p>
+        </p:txBody>
+      </p:sp>
+      <p:sp>
+        <p:nvSpPr>
+          <p:cNvPr id="4" name="Slide Number Placeholder 3"/>
+          <p:cNvSpPr>
+            <a:spLocks noGrp="1"/>
+          </p:cNvSpPr>
+          <p:nvPr>
+            <p:ph type="sldNum" sz="quarter" idx="5"/>
+          </p:nvPr>
+        </p:nvSpPr>
+        <p:spPr/>
+        <p:txBody>
+          <a:bodyPr/>
+          <a:lstStyle/>
+          <a:p>
+            <a:fld id="{AB4F6275-0E25-4E4E-99DE-2002C9C04F42}" type="slidenum">
+              <a:rPr lang="en-US" smtClean="0"/>
+              <a:t>8</a:t>
+            </a:fld>
+            <a:endParaRPr lang="en-US"/>
+          </a:p>
+        </p:txBody>
+      </p:sp>
+    </p:spTree>
+    <p:extLst>
+      <p:ext uri="{BB962C8B-B14F-4D97-AF65-F5344CB8AC3E}">
+        <p14:creationId xmlns:p14="http://schemas.microsoft.com/office/powerpoint/2010/main" val="3099266444"/>
+      </p:ext>
+    </p:extLst>
+  </p:cSld>
+  <p:clrMapOvr>
+    <a:masterClrMapping/>
+  </p:clrMapOvr>
+</p:notes>
 </file>
 
 <file path=ppt/slideLayouts/slideLayout1.xml><?xml version="1.0" encoding="utf-8"?>
@@ -262,7 +999,7 @@
           <a:p>
             <a:fld id="{0BDBB3A1-2EF5-4059-B138-43CC68EA68D2}" type="datetimeFigureOut">
               <a:rPr lang="en-US" smtClean="0"/>
-              <a:t>11/4/2018</a:t>
+              <a:t>11/5/2018</a:t>
             </a:fld>
             <a:endParaRPr lang="en-US"/>
           </a:p>
@@ -460,7 +1197,7 @@
           <a:p>
             <a:fld id="{0BDBB3A1-2EF5-4059-B138-43CC68EA68D2}" type="datetimeFigureOut">
               <a:rPr lang="en-US" smtClean="0"/>
-              <a:t>11/4/2018</a:t>
+              <a:t>11/5/2018</a:t>
             </a:fld>
             <a:endParaRPr lang="en-US"/>
           </a:p>
@@ -668,7 +1405,7 @@
           <a:p>
             <a:fld id="{0BDBB3A1-2EF5-4059-B138-43CC68EA68D2}" type="datetimeFigureOut">
               <a:rPr lang="en-US" smtClean="0"/>
-              <a:t>11/4/2018</a:t>
+              <a:t>11/5/2018</a:t>
             </a:fld>
             <a:endParaRPr lang="en-US"/>
           </a:p>
@@ -866,7 +1603,7 @@
           <a:p>
             <a:fld id="{0BDBB3A1-2EF5-4059-B138-43CC68EA68D2}" type="datetimeFigureOut">
               <a:rPr lang="en-US" smtClean="0"/>
-              <a:t>11/4/2018</a:t>
+              <a:t>11/5/2018</a:t>
             </a:fld>
             <a:endParaRPr lang="en-US"/>
           </a:p>
@@ -1141,7 +1878,7 @@
           <a:p>
             <a:fld id="{0BDBB3A1-2EF5-4059-B138-43CC68EA68D2}" type="datetimeFigureOut">
               <a:rPr lang="en-US" smtClean="0"/>
-              <a:t>11/4/2018</a:t>
+              <a:t>11/5/2018</a:t>
             </a:fld>
             <a:endParaRPr lang="en-US"/>
           </a:p>
@@ -1406,7 +2143,7 @@
           <a:p>
             <a:fld id="{0BDBB3A1-2EF5-4059-B138-43CC68EA68D2}" type="datetimeFigureOut">
               <a:rPr lang="en-US" smtClean="0"/>
-              <a:t>11/4/2018</a:t>
+              <a:t>11/5/2018</a:t>
             </a:fld>
             <a:endParaRPr lang="en-US"/>
           </a:p>
@@ -1818,7 +2555,7 @@
           <a:p>
             <a:fld id="{0BDBB3A1-2EF5-4059-B138-43CC68EA68D2}" type="datetimeFigureOut">
               <a:rPr lang="en-US" smtClean="0"/>
-              <a:t>11/4/2018</a:t>
+              <a:t>11/5/2018</a:t>
             </a:fld>
             <a:endParaRPr lang="en-US"/>
           </a:p>
@@ -1959,7 +2696,7 @@
           <a:p>
             <a:fld id="{0BDBB3A1-2EF5-4059-B138-43CC68EA68D2}" type="datetimeFigureOut">
               <a:rPr lang="en-US" smtClean="0"/>
-              <a:t>11/4/2018</a:t>
+              <a:t>11/5/2018</a:t>
             </a:fld>
             <a:endParaRPr lang="en-US"/>
           </a:p>
@@ -2072,7 +2809,7 @@
           <a:p>
             <a:fld id="{0BDBB3A1-2EF5-4059-B138-43CC68EA68D2}" type="datetimeFigureOut">
               <a:rPr lang="en-US" smtClean="0"/>
-              <a:t>11/4/2018</a:t>
+              <a:t>11/5/2018</a:t>
             </a:fld>
             <a:endParaRPr lang="en-US"/>
           </a:p>
@@ -2383,7 +3120,7 @@
           <a:p>
             <a:fld id="{0BDBB3A1-2EF5-4059-B138-43CC68EA68D2}" type="datetimeFigureOut">
               <a:rPr lang="en-US" smtClean="0"/>
-              <a:t>11/4/2018</a:t>
+              <a:t>11/5/2018</a:t>
             </a:fld>
             <a:endParaRPr lang="en-US"/>
           </a:p>
@@ -2671,7 +3408,7 @@
           <a:p>
             <a:fld id="{0BDBB3A1-2EF5-4059-B138-43CC68EA68D2}" type="datetimeFigureOut">
               <a:rPr lang="en-US" smtClean="0"/>
-              <a:t>11/4/2018</a:t>
+              <a:t>11/5/2018</a:t>
             </a:fld>
             <a:endParaRPr lang="en-US"/>
           </a:p>
@@ -2912,7 +3649,7 @@
           <a:p>
             <a:fld id="{0BDBB3A1-2EF5-4059-B138-43CC68EA68D2}" type="datetimeFigureOut">
               <a:rPr lang="en-US" smtClean="0"/>
-              <a:t>11/4/2018</a:t>
+              <a:t>11/5/2018</a:t>
             </a:fld>
             <a:endParaRPr lang="en-US"/>
           </a:p>
@@ -3405,6 +4142,1410 @@
 </p:sld>
 </file>
 
+<file path=ppt/slides/slide10.xml><?xml version="1.0" encoding="utf-8"?>
+<p:sld xmlns:a="http://schemas.openxmlformats.org/drawingml/2006/main" xmlns:r="http://schemas.openxmlformats.org/officeDocument/2006/relationships" xmlns:p="http://schemas.openxmlformats.org/presentationml/2006/main">
+  <p:cSld>
+    <p:spTree>
+      <p:nvGrpSpPr>
+        <p:cNvPr id="1" name=""/>
+        <p:cNvGrpSpPr/>
+        <p:nvPr/>
+      </p:nvGrpSpPr>
+      <p:grpSpPr>
+        <a:xfrm>
+          <a:off x="0" y="0"/>
+          <a:ext cx="0" cy="0"/>
+          <a:chOff x="0" y="0"/>
+          <a:chExt cx="0" cy="0"/>
+        </a:xfrm>
+      </p:grpSpPr>
+      <p:sp>
+        <p:nvSpPr>
+          <p:cNvPr id="2" name="Title 1">
+            <a:extLst>
+              <a:ext uri="{FF2B5EF4-FFF2-40B4-BE49-F238E27FC236}">
+                <a16:creationId xmlns:a16="http://schemas.microsoft.com/office/drawing/2014/main" id="{C5DD3539-75DA-4ECB-96DA-4ADA2B1974D4}"/>
+              </a:ext>
+            </a:extLst>
+          </p:cNvPr>
+          <p:cNvSpPr>
+            <a:spLocks noGrp="1"/>
+          </p:cNvSpPr>
+          <p:nvPr>
+            <p:ph type="title"/>
+          </p:nvPr>
+        </p:nvSpPr>
+        <p:spPr/>
+        <p:txBody>
+          <a:bodyPr/>
+          <a:lstStyle/>
+          <a:p>
+            <a:r>
+              <a:rPr lang="en-US" dirty="0"/>
+              <a:t>Mean Squared Error</a:t>
+            </a:r>
+          </a:p>
+        </p:txBody>
+      </p:sp>
+      <mc:AlternateContent xmlns:mc="http://schemas.openxmlformats.org/markup-compatibility/2006">
+        <mc:Choice xmlns:a14="http://schemas.microsoft.com/office/drawing/2010/main" Requires="a14">
+          <p:sp>
+            <p:nvSpPr>
+              <p:cNvPr id="3" name="Content Placeholder 2">
+                <a:extLst>
+                  <a:ext uri="{FF2B5EF4-FFF2-40B4-BE49-F238E27FC236}">
+                    <a16:creationId xmlns:a16="http://schemas.microsoft.com/office/drawing/2014/main" id="{7233A35F-E784-461C-9B6D-D917D63103C9}"/>
+                  </a:ext>
+                </a:extLst>
+              </p:cNvPr>
+              <p:cNvSpPr>
+                <a:spLocks noGrp="1"/>
+              </p:cNvSpPr>
+              <p:nvPr>
+                <p:ph idx="1"/>
+              </p:nvPr>
+            </p:nvSpPr>
+            <p:spPr/>
+            <p:txBody>
+              <a:bodyPr/>
+              <a:lstStyle/>
+              <a:p>
+                <a:r>
+                  <a:rPr lang="en-US" dirty="0"/>
+                  <a:t>Simplistic function most of you should be familiar with to compute loss</a:t>
+                </a:r>
+              </a:p>
+              <a:p>
+                <a:r>
+                  <a:rPr lang="en-US" dirty="0"/>
+                  <a:t>This function also penalizes error heavily</a:t>
+                </a:r>
+              </a:p>
+              <a:p>
+                <a:pPr marL="457200" lvl="1" indent="0">
+                  <a:buNone/>
+                </a:pPr>
+                <a14:m>
+                  <m:oMathPara xmlns:m="http://schemas.openxmlformats.org/officeDocument/2006/math">
+                    <m:oMathParaPr>
+                      <m:jc m:val="centerGroup"/>
+                    </m:oMathParaPr>
+                    <m:oMath xmlns:m="http://schemas.openxmlformats.org/officeDocument/2006/math">
+                      <m:r>
+                        <a:rPr lang="en-US" b="0" i="1" smtClean="0">
+                          <a:latin typeface="Cambria Math" panose="02040503050406030204" pitchFamily="18" charset="0"/>
+                        </a:rPr>
+                        <m:t>𝑀𝑆𝐸</m:t>
+                      </m:r>
+                      <m:r>
+                        <a:rPr lang="en-US" b="0" i="1" smtClean="0">
+                          <a:latin typeface="Cambria Math" panose="02040503050406030204" pitchFamily="18" charset="0"/>
+                        </a:rPr>
+                        <m:t>= </m:t>
+                      </m:r>
+                      <m:f>
+                        <m:fPr>
+                          <m:ctrlPr>
+                            <a:rPr lang="en-US" b="0" i="1" smtClean="0">
+                              <a:latin typeface="Cambria Math" panose="02040503050406030204" pitchFamily="18" charset="0"/>
+                            </a:rPr>
+                          </m:ctrlPr>
+                        </m:fPr>
+                        <m:num>
+                          <m:r>
+                            <a:rPr lang="en-US" b="0" i="1" smtClean="0">
+                              <a:latin typeface="Cambria Math" panose="02040503050406030204" pitchFamily="18" charset="0"/>
+                            </a:rPr>
+                            <m:t>1</m:t>
+                          </m:r>
+                        </m:num>
+                        <m:den>
+                          <m:r>
+                            <a:rPr lang="en-US" b="0" i="1" smtClean="0">
+                              <a:latin typeface="Cambria Math" panose="02040503050406030204" pitchFamily="18" charset="0"/>
+                            </a:rPr>
+                            <m:t>𝑁</m:t>
+                          </m:r>
+                        </m:den>
+                      </m:f>
+                      <m:nary>
+                        <m:naryPr>
+                          <m:chr m:val="∑"/>
+                          <m:ctrlPr>
+                            <a:rPr lang="en-US" b="0" i="1" smtClean="0">
+                              <a:latin typeface="Cambria Math" panose="02040503050406030204" pitchFamily="18" charset="0"/>
+                            </a:rPr>
+                          </m:ctrlPr>
+                        </m:naryPr>
+                        <m:sub>
+                          <m:r>
+                            <m:rPr>
+                              <m:brk m:alnAt="23"/>
+                            </m:rPr>
+                            <a:rPr lang="en-US" b="0" i="1" smtClean="0">
+                              <a:latin typeface="Cambria Math" panose="02040503050406030204" pitchFamily="18" charset="0"/>
+                            </a:rPr>
+                            <m:t>𝑖</m:t>
+                          </m:r>
+                          <m:r>
+                            <a:rPr lang="en-US" b="0" i="1" smtClean="0">
+                              <a:latin typeface="Cambria Math" panose="02040503050406030204" pitchFamily="18" charset="0"/>
+                            </a:rPr>
+                            <m:t>=1</m:t>
+                          </m:r>
+                        </m:sub>
+                        <m:sup>
+                          <m:r>
+                            <a:rPr lang="en-US" b="0" i="1" smtClean="0">
+                              <a:latin typeface="Cambria Math" panose="02040503050406030204" pitchFamily="18" charset="0"/>
+                            </a:rPr>
+                            <m:t>𝑁</m:t>
+                          </m:r>
+                        </m:sup>
+                        <m:e>
+                          <m:sSup>
+                            <m:sSupPr>
+                              <m:ctrlPr>
+                                <a:rPr lang="en-US" b="0" i="1" smtClean="0">
+                                  <a:latin typeface="Cambria Math" panose="02040503050406030204" pitchFamily="18" charset="0"/>
+                                </a:rPr>
+                              </m:ctrlPr>
+                            </m:sSupPr>
+                            <m:e>
+                              <m:r>
+                                <a:rPr lang="en-US" i="1">
+                                  <a:latin typeface="Cambria Math" panose="02040503050406030204" pitchFamily="18" charset="0"/>
+                                </a:rPr>
+                                <m:t>(</m:t>
+                              </m:r>
+                              <m:sSub>
+                                <m:sSubPr>
+                                  <m:ctrlPr>
+                                    <a:rPr lang="en-US" i="1">
+                                      <a:latin typeface="Cambria Math" panose="02040503050406030204" pitchFamily="18" charset="0"/>
+                                    </a:rPr>
+                                  </m:ctrlPr>
+                                </m:sSubPr>
+                                <m:e>
+                                  <m:r>
+                                    <a:rPr lang="en-US" i="1">
+                                      <a:latin typeface="Cambria Math" panose="02040503050406030204" pitchFamily="18" charset="0"/>
+                                    </a:rPr>
+                                    <m:t>𝑦</m:t>
+                                  </m:r>
+                                </m:e>
+                                <m:sub>
+                                  <m:r>
+                                    <a:rPr lang="en-US" i="1">
+                                      <a:latin typeface="Cambria Math" panose="02040503050406030204" pitchFamily="18" charset="0"/>
+                                    </a:rPr>
+                                    <m:t>𝑖</m:t>
+                                  </m:r>
+                                </m:sub>
+                              </m:sSub>
+                              <m:r>
+                                <a:rPr lang="en-US" i="1">
+                                  <a:latin typeface="Cambria Math" panose="02040503050406030204" pitchFamily="18" charset="0"/>
+                                </a:rPr>
+                                <m:t> − </m:t>
+                              </m:r>
+                              <m:sSub>
+                                <m:sSubPr>
+                                  <m:ctrlPr>
+                                    <a:rPr lang="en-US" i="1">
+                                      <a:latin typeface="Cambria Math" panose="02040503050406030204" pitchFamily="18" charset="0"/>
+                                    </a:rPr>
+                                  </m:ctrlPr>
+                                </m:sSubPr>
+                                <m:e>
+                                  <m:r>
+                                    <a:rPr lang="cy-GB" i="1">
+                                      <a:latin typeface="Cambria Math" panose="02040503050406030204" pitchFamily="18" charset="0"/>
+                                      <a:ea typeface="Cambria Math" panose="02040503050406030204" pitchFamily="18" charset="0"/>
+                                    </a:rPr>
+                                    <m:t>ŷ</m:t>
+                                  </m:r>
+                                </m:e>
+                                <m:sub>
+                                  <m:r>
+                                    <a:rPr lang="en-US" i="1">
+                                      <a:latin typeface="Cambria Math" panose="02040503050406030204" pitchFamily="18" charset="0"/>
+                                    </a:rPr>
+                                    <m:t>𝑖</m:t>
+                                  </m:r>
+                                </m:sub>
+                              </m:sSub>
+                              <m:r>
+                                <a:rPr lang="en-US" b="0" i="1" smtClean="0">
+                                  <a:latin typeface="Cambria Math" panose="02040503050406030204" pitchFamily="18" charset="0"/>
+                                </a:rPr>
+                                <m:t>)</m:t>
+                              </m:r>
+                            </m:e>
+                            <m:sup>
+                              <m:r>
+                                <a:rPr lang="en-US" b="0" i="1" smtClean="0">
+                                  <a:latin typeface="Cambria Math" panose="02040503050406030204" pitchFamily="18" charset="0"/>
+                                </a:rPr>
+                                <m:t>2</m:t>
+                              </m:r>
+                            </m:sup>
+                          </m:sSup>
+                        </m:e>
+                      </m:nary>
+                    </m:oMath>
+                  </m:oMathPara>
+                </a14:m>
+                <a:endParaRPr lang="en-US" dirty="0"/>
+              </a:p>
+              <a:p>
+                <a:endParaRPr lang="en-US" dirty="0"/>
+              </a:p>
+            </p:txBody>
+          </p:sp>
+        </mc:Choice>
+        <mc:Fallback>
+          <p:sp>
+            <p:nvSpPr>
+              <p:cNvPr id="3" name="Content Placeholder 2">
+                <a:extLst>
+                  <a:ext uri="{FF2B5EF4-FFF2-40B4-BE49-F238E27FC236}">
+                    <a16:creationId xmlns:a16="http://schemas.microsoft.com/office/drawing/2014/main" id="{7233A35F-E784-461C-9B6D-D917D63103C9}"/>
+                  </a:ext>
+                </a:extLst>
+              </p:cNvPr>
+              <p:cNvSpPr>
+                <a:spLocks noGrp="1" noRot="1" noChangeAspect="1" noMove="1" noResize="1" noEditPoints="1" noAdjustHandles="1" noChangeArrowheads="1" noChangeShapeType="1" noTextEdit="1"/>
+              </p:cNvSpPr>
+              <p:nvPr>
+                <p:ph idx="1"/>
+              </p:nvPr>
+            </p:nvSpPr>
+            <p:spPr>
+              <a:blipFill>
+                <a:blip r:embed="rId2"/>
+                <a:stretch>
+                  <a:fillRect l="-1043" t="-2241"/>
+                </a:stretch>
+              </a:blipFill>
+            </p:spPr>
+            <p:txBody>
+              <a:bodyPr/>
+              <a:lstStyle/>
+              <a:p>
+                <a:r>
+                  <a:rPr lang="en-US">
+                    <a:noFill/>
+                  </a:rPr>
+                  <a:t> </a:t>
+                </a:r>
+              </a:p>
+            </p:txBody>
+          </p:sp>
+        </mc:Fallback>
+      </mc:AlternateContent>
+    </p:spTree>
+    <p:extLst>
+      <p:ext uri="{BB962C8B-B14F-4D97-AF65-F5344CB8AC3E}">
+        <p14:creationId xmlns:p14="http://schemas.microsoft.com/office/powerpoint/2010/main" val="3046188352"/>
+      </p:ext>
+    </p:extLst>
+  </p:cSld>
+  <p:clrMapOvr>
+    <a:masterClrMapping/>
+  </p:clrMapOvr>
+</p:sld>
+</file>
+
+<file path=ppt/slides/slide11.xml><?xml version="1.0" encoding="utf-8"?>
+<p:sld xmlns:a="http://schemas.openxmlformats.org/drawingml/2006/main" xmlns:r="http://schemas.openxmlformats.org/officeDocument/2006/relationships" xmlns:p="http://schemas.openxmlformats.org/presentationml/2006/main">
+  <p:cSld>
+    <p:spTree>
+      <p:nvGrpSpPr>
+        <p:cNvPr id="1" name=""/>
+        <p:cNvGrpSpPr/>
+        <p:nvPr/>
+      </p:nvGrpSpPr>
+      <p:grpSpPr>
+        <a:xfrm>
+          <a:off x="0" y="0"/>
+          <a:ext cx="0" cy="0"/>
+          <a:chOff x="0" y="0"/>
+          <a:chExt cx="0" cy="0"/>
+        </a:xfrm>
+      </p:grpSpPr>
+      <p:sp>
+        <p:nvSpPr>
+          <p:cNvPr id="2" name="Title 1">
+            <a:extLst>
+              <a:ext uri="{FF2B5EF4-FFF2-40B4-BE49-F238E27FC236}">
+                <a16:creationId xmlns:a16="http://schemas.microsoft.com/office/drawing/2014/main" id="{6B0DAE5A-1077-47A0-B6D7-370E18E9FE6A}"/>
+              </a:ext>
+            </a:extLst>
+          </p:cNvPr>
+          <p:cNvSpPr>
+            <a:spLocks noGrp="1"/>
+          </p:cNvSpPr>
+          <p:nvPr>
+            <p:ph type="title"/>
+          </p:nvPr>
+        </p:nvSpPr>
+        <p:spPr/>
+        <p:txBody>
+          <a:bodyPr/>
+          <a:lstStyle/>
+          <a:p>
+            <a:r>
+              <a:rPr lang="en-US" dirty="0"/>
+              <a:t>So what is Cost used for?</a:t>
+            </a:r>
+          </a:p>
+        </p:txBody>
+      </p:sp>
+      <p:sp>
+        <p:nvSpPr>
+          <p:cNvPr id="3" name="Content Placeholder 2">
+            <a:extLst>
+              <a:ext uri="{FF2B5EF4-FFF2-40B4-BE49-F238E27FC236}">
+                <a16:creationId xmlns:a16="http://schemas.microsoft.com/office/drawing/2014/main" id="{3439B645-78A3-4980-B22C-28342DA850F7}"/>
+              </a:ext>
+            </a:extLst>
+          </p:cNvPr>
+          <p:cNvSpPr>
+            <a:spLocks noGrp="1"/>
+          </p:cNvSpPr>
+          <p:nvPr>
+            <p:ph idx="1"/>
+          </p:nvPr>
+        </p:nvSpPr>
+        <p:spPr/>
+        <p:txBody>
+          <a:bodyPr/>
+          <a:lstStyle/>
+          <a:p>
+            <a:r>
+              <a:rPr lang="en-US" dirty="0"/>
+              <a:t>As mentioned, cost is used to determine how accurate the model is through comparing the predicted values with labeled values.</a:t>
+            </a:r>
+          </a:p>
+          <a:p>
+            <a:r>
+              <a:rPr lang="en-US" dirty="0"/>
+              <a:t>Ideally, this value needs to be minimized so that we will achieve high accuracy with our model</a:t>
+            </a:r>
+          </a:p>
+          <a:p>
+            <a:r>
+              <a:rPr lang="en-US" dirty="0"/>
+              <a:t>To actually minimize this value, we have to apply gradient descent</a:t>
+            </a:r>
+          </a:p>
+        </p:txBody>
+      </p:sp>
+    </p:spTree>
+    <p:extLst>
+      <p:ext uri="{BB962C8B-B14F-4D97-AF65-F5344CB8AC3E}">
+        <p14:creationId xmlns:p14="http://schemas.microsoft.com/office/powerpoint/2010/main" val="2168600291"/>
+      </p:ext>
+    </p:extLst>
+  </p:cSld>
+  <p:clrMapOvr>
+    <a:masterClrMapping/>
+  </p:clrMapOvr>
+</p:sld>
+</file>
+
+<file path=ppt/slides/slide12.xml><?xml version="1.0" encoding="utf-8"?>
+<p:sld xmlns:a="http://schemas.openxmlformats.org/drawingml/2006/main" xmlns:r="http://schemas.openxmlformats.org/officeDocument/2006/relationships" xmlns:p="http://schemas.openxmlformats.org/presentationml/2006/main">
+  <p:cSld>
+    <p:spTree>
+      <p:nvGrpSpPr>
+        <p:cNvPr id="1" name=""/>
+        <p:cNvGrpSpPr/>
+        <p:nvPr/>
+      </p:nvGrpSpPr>
+      <p:grpSpPr>
+        <a:xfrm>
+          <a:off x="0" y="0"/>
+          <a:ext cx="0" cy="0"/>
+          <a:chOff x="0" y="0"/>
+          <a:chExt cx="0" cy="0"/>
+        </a:xfrm>
+      </p:grpSpPr>
+      <p:sp>
+        <p:nvSpPr>
+          <p:cNvPr id="2" name="Title 1">
+            <a:extLst>
+              <a:ext uri="{FF2B5EF4-FFF2-40B4-BE49-F238E27FC236}">
+                <a16:creationId xmlns:a16="http://schemas.microsoft.com/office/drawing/2014/main" id="{019D91DB-301F-43C0-A103-90B2FF5D284C}"/>
+              </a:ext>
+            </a:extLst>
+          </p:cNvPr>
+          <p:cNvSpPr>
+            <a:spLocks noGrp="1"/>
+          </p:cNvSpPr>
+          <p:nvPr>
+            <p:ph type="title"/>
+          </p:nvPr>
+        </p:nvSpPr>
+        <p:spPr/>
+        <p:txBody>
+          <a:bodyPr/>
+          <a:lstStyle/>
+          <a:p>
+            <a:r>
+              <a:rPr lang="en-US" dirty="0"/>
+              <a:t>Gradient Descent</a:t>
+            </a:r>
+          </a:p>
+        </p:txBody>
+      </p:sp>
+      <p:sp>
+        <p:nvSpPr>
+          <p:cNvPr id="3" name="Content Placeholder 2">
+            <a:extLst>
+              <a:ext uri="{FF2B5EF4-FFF2-40B4-BE49-F238E27FC236}">
+                <a16:creationId xmlns:a16="http://schemas.microsoft.com/office/drawing/2014/main" id="{12D69B38-3F37-48D3-BCEB-D8E41ADB1CE0}"/>
+              </a:ext>
+            </a:extLst>
+          </p:cNvPr>
+          <p:cNvSpPr>
+            <a:spLocks noGrp="1"/>
+          </p:cNvSpPr>
+          <p:nvPr>
+            <p:ph idx="1"/>
+          </p:nvPr>
+        </p:nvSpPr>
+        <p:spPr/>
+        <p:txBody>
+          <a:bodyPr/>
+          <a:lstStyle/>
+          <a:p>
+            <a:r>
+              <a:rPr lang="en-US" dirty="0"/>
+              <a:t>Using calculus, we are able to determine the slope of the loss and then take a “step” downward to approach the global minimum</a:t>
+            </a:r>
+          </a:p>
+          <a:p>
+            <a:r>
+              <a:rPr lang="en-US" dirty="0"/>
+              <a:t>However, as we will have many hundreds or thousands of parameters (each w and b term associated with the algorithm) we would need to calculate slopes, but gradients</a:t>
+            </a:r>
+          </a:p>
+          <a:p>
+            <a:r>
+              <a:rPr lang="en-US" dirty="0"/>
+              <a:t>This will allow us to determine which area in space we should step, with respect to all of the input variables, to get to the next smaller value</a:t>
+            </a:r>
+          </a:p>
+          <a:p>
+            <a:endParaRPr lang="en-US" dirty="0"/>
+          </a:p>
+        </p:txBody>
+      </p:sp>
+    </p:spTree>
+    <p:extLst>
+      <p:ext uri="{BB962C8B-B14F-4D97-AF65-F5344CB8AC3E}">
+        <p14:creationId xmlns:p14="http://schemas.microsoft.com/office/powerpoint/2010/main" val="1636868832"/>
+      </p:ext>
+    </p:extLst>
+  </p:cSld>
+  <p:clrMapOvr>
+    <a:masterClrMapping/>
+  </p:clrMapOvr>
+</p:sld>
+</file>
+
+<file path=ppt/slides/slide13.xml><?xml version="1.0" encoding="utf-8"?>
+<p:sld xmlns:a="http://schemas.openxmlformats.org/drawingml/2006/main" xmlns:r="http://schemas.openxmlformats.org/officeDocument/2006/relationships" xmlns:p="http://schemas.openxmlformats.org/presentationml/2006/main">
+  <p:cSld>
+    <p:spTree>
+      <p:nvGrpSpPr>
+        <p:cNvPr id="1" name=""/>
+        <p:cNvGrpSpPr/>
+        <p:nvPr/>
+      </p:nvGrpSpPr>
+      <p:grpSpPr>
+        <a:xfrm>
+          <a:off x="0" y="0"/>
+          <a:ext cx="0" cy="0"/>
+          <a:chOff x="0" y="0"/>
+          <a:chExt cx="0" cy="0"/>
+        </a:xfrm>
+      </p:grpSpPr>
+      <p:sp>
+        <p:nvSpPr>
+          <p:cNvPr id="2" name="Title 1">
+            <a:extLst>
+              <a:ext uri="{FF2B5EF4-FFF2-40B4-BE49-F238E27FC236}">
+                <a16:creationId xmlns:a16="http://schemas.microsoft.com/office/drawing/2014/main" id="{01862D45-66C7-4D12-90C0-3DA1B0970F1B}"/>
+              </a:ext>
+            </a:extLst>
+          </p:cNvPr>
+          <p:cNvSpPr>
+            <a:spLocks noGrp="1"/>
+          </p:cNvSpPr>
+          <p:nvPr>
+            <p:ph type="title"/>
+          </p:nvPr>
+        </p:nvSpPr>
+        <p:spPr/>
+        <p:txBody>
+          <a:bodyPr/>
+          <a:lstStyle/>
+          <a:p>
+            <a:r>
+              <a:rPr lang="en-US" dirty="0"/>
+              <a:t>Example of Steps Taken</a:t>
+            </a:r>
+          </a:p>
+        </p:txBody>
+      </p:sp>
+      <p:sp>
+        <p:nvSpPr>
+          <p:cNvPr id="3" name="Content Placeholder 2">
+            <a:extLst>
+              <a:ext uri="{FF2B5EF4-FFF2-40B4-BE49-F238E27FC236}">
+                <a16:creationId xmlns:a16="http://schemas.microsoft.com/office/drawing/2014/main" id="{E4C79DF8-0DE0-45FC-9131-CE51AD381654}"/>
+              </a:ext>
+            </a:extLst>
+          </p:cNvPr>
+          <p:cNvSpPr>
+            <a:spLocks noGrp="1"/>
+          </p:cNvSpPr>
+          <p:nvPr>
+            <p:ph idx="1"/>
+          </p:nvPr>
+        </p:nvSpPr>
+        <p:spPr>
+          <a:xfrm>
+            <a:off x="838200" y="1586139"/>
+            <a:ext cx="10515600" cy="4351338"/>
+          </a:xfrm>
+        </p:spPr>
+        <p:txBody>
+          <a:bodyPr/>
+          <a:lstStyle/>
+          <a:p>
+            <a:r>
+              <a:rPr lang="en-US" dirty="0"/>
+              <a:t>Each step progressively decreases the error as it approaches </a:t>
+            </a:r>
+            <a:r>
+              <a:rPr lang="en-US" dirty="0" err="1"/>
+              <a:t>globabl</a:t>
+            </a:r>
+            <a:r>
+              <a:rPr lang="en-US" dirty="0"/>
+              <a:t> minimum</a:t>
+            </a:r>
+          </a:p>
+          <a:p>
+            <a:r>
+              <a:rPr lang="en-US" dirty="0"/>
+              <a:t>As we mentioned earlier, a global minimum will beam accuracy of the model</a:t>
+            </a:r>
+          </a:p>
+        </p:txBody>
+      </p:sp>
+      <p:pic>
+        <p:nvPicPr>
+          <p:cNvPr id="4" name="Picture 2" descr="https://cdn-images-1.medium.com/max/1600/0*qtiSV8B2__XR52XP.jpg">
+            <a:extLst>
+              <a:ext uri="{FF2B5EF4-FFF2-40B4-BE49-F238E27FC236}">
+                <a16:creationId xmlns:a16="http://schemas.microsoft.com/office/drawing/2014/main" id="{2EF03020-910B-472F-B82A-10CFBFDD5A58}"/>
+              </a:ext>
+            </a:extLst>
+          </p:cNvPr>
+          <p:cNvPicPr>
+            <a:picLocks noChangeAspect="1" noChangeArrowheads="1"/>
+          </p:cNvPicPr>
+          <p:nvPr/>
+        </p:nvPicPr>
+        <p:blipFill>
+          <a:blip r:embed="rId2">
+            <a:extLst>
+              <a:ext uri="{28A0092B-C50C-407E-A947-70E740481C1C}">
+                <a14:useLocalDpi xmlns:a14="http://schemas.microsoft.com/office/drawing/2010/main" val="0"/>
+              </a:ext>
+            </a:extLst>
+          </a:blip>
+          <a:srcRect/>
+          <a:stretch>
+            <a:fillRect/>
+          </a:stretch>
+        </p:blipFill>
+        <p:spPr bwMode="auto">
+          <a:xfrm>
+            <a:off x="2886056" y="3429000"/>
+            <a:ext cx="5985802" cy="3112617"/>
+          </a:xfrm>
+          <a:prstGeom prst="rect">
+            <a:avLst/>
+          </a:prstGeom>
+          <a:noFill/>
+          <a:extLst>
+            <a:ext uri="{909E8E84-426E-40DD-AFC4-6F175D3DCCD1}">
+              <a14:hiddenFill xmlns:a14="http://schemas.microsoft.com/office/drawing/2010/main">
+                <a:solidFill>
+                  <a:srgbClr val="FFFFFF"/>
+                </a:solidFill>
+              </a14:hiddenFill>
+            </a:ext>
+          </a:extLst>
+        </p:spPr>
+      </p:pic>
+    </p:spTree>
+    <p:extLst>
+      <p:ext uri="{BB962C8B-B14F-4D97-AF65-F5344CB8AC3E}">
+        <p14:creationId xmlns:p14="http://schemas.microsoft.com/office/powerpoint/2010/main" val="2883742246"/>
+      </p:ext>
+    </p:extLst>
+  </p:cSld>
+  <p:clrMapOvr>
+    <a:masterClrMapping/>
+  </p:clrMapOvr>
+</p:sld>
+</file>
+
+<file path=ppt/slides/slide14.xml><?xml version="1.0" encoding="utf-8"?>
+<p:sld xmlns:a="http://schemas.openxmlformats.org/drawingml/2006/main" xmlns:r="http://schemas.openxmlformats.org/officeDocument/2006/relationships" xmlns:p="http://schemas.openxmlformats.org/presentationml/2006/main">
+  <p:cSld>
+    <p:spTree>
+      <p:nvGrpSpPr>
+        <p:cNvPr id="1" name=""/>
+        <p:cNvGrpSpPr/>
+        <p:nvPr/>
+      </p:nvGrpSpPr>
+      <p:grpSpPr>
+        <a:xfrm>
+          <a:off x="0" y="0"/>
+          <a:ext cx="0" cy="0"/>
+          <a:chOff x="0" y="0"/>
+          <a:chExt cx="0" cy="0"/>
+        </a:xfrm>
+      </p:grpSpPr>
+      <p:sp>
+        <p:nvSpPr>
+          <p:cNvPr id="2" name="Title 1">
+            <a:extLst>
+              <a:ext uri="{FF2B5EF4-FFF2-40B4-BE49-F238E27FC236}">
+                <a16:creationId xmlns:a16="http://schemas.microsoft.com/office/drawing/2014/main" id="{019D91DB-301F-43C0-A103-90B2FF5D284C}"/>
+              </a:ext>
+            </a:extLst>
+          </p:cNvPr>
+          <p:cNvSpPr>
+            <a:spLocks noGrp="1"/>
+          </p:cNvSpPr>
+          <p:nvPr>
+            <p:ph type="title"/>
+          </p:nvPr>
+        </p:nvSpPr>
+        <p:spPr/>
+        <p:txBody>
+          <a:bodyPr/>
+          <a:lstStyle/>
+          <a:p>
+            <a:r>
+              <a:rPr lang="en-US" dirty="0"/>
+              <a:t>Gradient Descent</a:t>
+            </a:r>
+          </a:p>
+        </p:txBody>
+      </p:sp>
+      <p:sp>
+        <p:nvSpPr>
+          <p:cNvPr id="3" name="Content Placeholder 2">
+            <a:extLst>
+              <a:ext uri="{FF2B5EF4-FFF2-40B4-BE49-F238E27FC236}">
+                <a16:creationId xmlns:a16="http://schemas.microsoft.com/office/drawing/2014/main" id="{12D69B38-3F37-48D3-BCEB-D8E41ADB1CE0}"/>
+              </a:ext>
+            </a:extLst>
+          </p:cNvPr>
+          <p:cNvSpPr>
+            <a:spLocks noGrp="1"/>
+          </p:cNvSpPr>
+          <p:nvPr>
+            <p:ph idx="1"/>
+          </p:nvPr>
+        </p:nvSpPr>
+        <p:spPr/>
+        <p:txBody>
+          <a:bodyPr/>
+          <a:lstStyle/>
+          <a:p>
+            <a:r>
+              <a:rPr lang="en-US" dirty="0"/>
+              <a:t>Using calculus, we are able to determine the slope of the loss and then take a “step” downward to approach the global minimum</a:t>
+            </a:r>
+          </a:p>
+          <a:p>
+            <a:r>
+              <a:rPr lang="en-US" dirty="0"/>
+              <a:t>However, as we will have many hundreds or thousands of parameters (each w and b term associated with the algorithm) we would need to calculate slopes, but gradients</a:t>
+            </a:r>
+          </a:p>
+          <a:p>
+            <a:r>
+              <a:rPr lang="en-US" dirty="0"/>
+              <a:t>This will allow us to determine which area in space we should step, with respect to all of the input variables, to get to the next smaller value</a:t>
+            </a:r>
+          </a:p>
+          <a:p>
+            <a:endParaRPr lang="en-US" dirty="0"/>
+          </a:p>
+        </p:txBody>
+      </p:sp>
+    </p:spTree>
+    <p:extLst>
+      <p:ext uri="{BB962C8B-B14F-4D97-AF65-F5344CB8AC3E}">
+        <p14:creationId xmlns:p14="http://schemas.microsoft.com/office/powerpoint/2010/main" val="330857367"/>
+      </p:ext>
+    </p:extLst>
+  </p:cSld>
+  <p:clrMapOvr>
+    <a:masterClrMapping/>
+  </p:clrMapOvr>
+</p:sld>
+</file>
+
+<file path=ppt/slides/slide15.xml><?xml version="1.0" encoding="utf-8"?>
+<p:sld xmlns:a="http://schemas.openxmlformats.org/drawingml/2006/main" xmlns:r="http://schemas.openxmlformats.org/officeDocument/2006/relationships" xmlns:p="http://schemas.openxmlformats.org/presentationml/2006/main">
+  <p:cSld>
+    <p:spTree>
+      <p:nvGrpSpPr>
+        <p:cNvPr id="1" name=""/>
+        <p:cNvGrpSpPr/>
+        <p:nvPr/>
+      </p:nvGrpSpPr>
+      <p:grpSpPr>
+        <a:xfrm>
+          <a:off x="0" y="0"/>
+          <a:ext cx="0" cy="0"/>
+          <a:chOff x="0" y="0"/>
+          <a:chExt cx="0" cy="0"/>
+        </a:xfrm>
+      </p:grpSpPr>
+      <p:sp>
+        <p:nvSpPr>
+          <p:cNvPr id="2" name="Title 1">
+            <a:extLst>
+              <a:ext uri="{FF2B5EF4-FFF2-40B4-BE49-F238E27FC236}">
+                <a16:creationId xmlns:a16="http://schemas.microsoft.com/office/drawing/2014/main" id="{0930BEB7-A1E8-4475-88F5-7D9AE874ADDA}"/>
+              </a:ext>
+            </a:extLst>
+          </p:cNvPr>
+          <p:cNvSpPr>
+            <a:spLocks noGrp="1"/>
+          </p:cNvSpPr>
+          <p:nvPr>
+            <p:ph type="title"/>
+          </p:nvPr>
+        </p:nvSpPr>
+        <p:spPr/>
+        <p:txBody>
+          <a:bodyPr/>
+          <a:lstStyle/>
+          <a:p>
+            <a:r>
+              <a:rPr lang="en-US" dirty="0"/>
+              <a:t>3D Visualization of GD</a:t>
+            </a:r>
+          </a:p>
+        </p:txBody>
+      </p:sp>
+      <p:sp>
+        <p:nvSpPr>
+          <p:cNvPr id="3" name="Content Placeholder 2">
+            <a:extLst>
+              <a:ext uri="{FF2B5EF4-FFF2-40B4-BE49-F238E27FC236}">
+                <a16:creationId xmlns:a16="http://schemas.microsoft.com/office/drawing/2014/main" id="{88B4BC70-192E-4B54-BE6A-915DAC6FA5CD}"/>
+              </a:ext>
+            </a:extLst>
+          </p:cNvPr>
+          <p:cNvSpPr>
+            <a:spLocks noGrp="1"/>
+          </p:cNvSpPr>
+          <p:nvPr>
+            <p:ph idx="1"/>
+          </p:nvPr>
+        </p:nvSpPr>
+        <p:spPr/>
+        <p:txBody>
+          <a:bodyPr/>
+          <a:lstStyle/>
+          <a:p>
+            <a:r>
+              <a:rPr lang="en-US" dirty="0"/>
+              <a:t>Good way to think of this is a ball rolling down a hill, it is trying to find a valley (our global minimum)</a:t>
+            </a:r>
+          </a:p>
+        </p:txBody>
+      </p:sp>
+      <p:pic>
+        <p:nvPicPr>
+          <p:cNvPr id="4100" name="Picture 4" descr="Image result for gradient descent 3d representation">
+            <a:extLst>
+              <a:ext uri="{FF2B5EF4-FFF2-40B4-BE49-F238E27FC236}">
+                <a16:creationId xmlns:a16="http://schemas.microsoft.com/office/drawing/2014/main" id="{BCCF8092-F1A0-492A-A8D0-5DE952669288}"/>
+              </a:ext>
+            </a:extLst>
+          </p:cNvPr>
+          <p:cNvPicPr>
+            <a:picLocks noChangeAspect="1" noChangeArrowheads="1"/>
+          </p:cNvPicPr>
+          <p:nvPr/>
+        </p:nvPicPr>
+        <p:blipFill>
+          <a:blip r:embed="rId2">
+            <a:extLst>
+              <a:ext uri="{28A0092B-C50C-407E-A947-70E740481C1C}">
+                <a14:useLocalDpi xmlns:a14="http://schemas.microsoft.com/office/drawing/2010/main" val="0"/>
+              </a:ext>
+            </a:extLst>
+          </a:blip>
+          <a:srcRect/>
+          <a:stretch>
+            <a:fillRect/>
+          </a:stretch>
+        </p:blipFill>
+        <p:spPr bwMode="auto">
+          <a:xfrm>
+            <a:off x="3918858" y="2822122"/>
+            <a:ext cx="4550228" cy="3981449"/>
+          </a:xfrm>
+          <a:prstGeom prst="rect">
+            <a:avLst/>
+          </a:prstGeom>
+          <a:noFill/>
+          <a:extLst>
+            <a:ext uri="{909E8E84-426E-40DD-AFC4-6F175D3DCCD1}">
+              <a14:hiddenFill xmlns:a14="http://schemas.microsoft.com/office/drawing/2010/main">
+                <a:solidFill>
+                  <a:srgbClr val="FFFFFF"/>
+                </a:solidFill>
+              </a14:hiddenFill>
+            </a:ext>
+          </a:extLst>
+        </p:spPr>
+      </p:pic>
+    </p:spTree>
+    <p:extLst>
+      <p:ext uri="{BB962C8B-B14F-4D97-AF65-F5344CB8AC3E}">
+        <p14:creationId xmlns:p14="http://schemas.microsoft.com/office/powerpoint/2010/main" val="1199048974"/>
+      </p:ext>
+    </p:extLst>
+  </p:cSld>
+  <p:clrMapOvr>
+    <a:masterClrMapping/>
+  </p:clrMapOvr>
+</p:sld>
+</file>
+
+<file path=ppt/slides/slide16.xml><?xml version="1.0" encoding="utf-8"?>
+<p:sld xmlns:a="http://schemas.openxmlformats.org/drawingml/2006/main" xmlns:r="http://schemas.openxmlformats.org/officeDocument/2006/relationships" xmlns:p="http://schemas.openxmlformats.org/presentationml/2006/main">
+  <p:cSld>
+    <p:spTree>
+      <p:nvGrpSpPr>
+        <p:cNvPr id="1" name=""/>
+        <p:cNvGrpSpPr/>
+        <p:nvPr/>
+      </p:nvGrpSpPr>
+      <p:grpSpPr>
+        <a:xfrm>
+          <a:off x="0" y="0"/>
+          <a:ext cx="0" cy="0"/>
+          <a:chOff x="0" y="0"/>
+          <a:chExt cx="0" cy="0"/>
+        </a:xfrm>
+      </p:grpSpPr>
+      <p:sp>
+        <p:nvSpPr>
+          <p:cNvPr id="2" name="Title 1">
+            <a:extLst>
+              <a:ext uri="{FF2B5EF4-FFF2-40B4-BE49-F238E27FC236}">
+                <a16:creationId xmlns:a16="http://schemas.microsoft.com/office/drawing/2014/main" id="{D70E7AD4-9090-4603-9484-3DFCFA0A7A1B}"/>
+              </a:ext>
+            </a:extLst>
+          </p:cNvPr>
+          <p:cNvSpPr>
+            <a:spLocks noGrp="1"/>
+          </p:cNvSpPr>
+          <p:nvPr>
+            <p:ph type="title"/>
+          </p:nvPr>
+        </p:nvSpPr>
+        <p:spPr/>
+        <p:txBody>
+          <a:bodyPr/>
+          <a:lstStyle/>
+          <a:p>
+            <a:r>
+              <a:rPr lang="en-US" dirty="0"/>
+              <a:t>Applying Cost to Update Parameters</a:t>
+            </a:r>
+          </a:p>
+        </p:txBody>
+      </p:sp>
+      <p:sp>
+        <p:nvSpPr>
+          <p:cNvPr id="3" name="Content Placeholder 2">
+            <a:extLst>
+              <a:ext uri="{FF2B5EF4-FFF2-40B4-BE49-F238E27FC236}">
+                <a16:creationId xmlns:a16="http://schemas.microsoft.com/office/drawing/2014/main" id="{4997C22D-6C2B-40F7-914A-86C6E01AEA33}"/>
+              </a:ext>
+            </a:extLst>
+          </p:cNvPr>
+          <p:cNvSpPr>
+            <a:spLocks noGrp="1"/>
+          </p:cNvSpPr>
+          <p:nvPr>
+            <p:ph idx="1"/>
+          </p:nvPr>
+        </p:nvSpPr>
+        <p:spPr>
+          <a:xfrm>
+            <a:off x="838200" y="1825625"/>
+            <a:ext cx="10515600" cy="4351338"/>
+          </a:xfrm>
+        </p:spPr>
+        <p:txBody>
+          <a:bodyPr/>
+          <a:lstStyle/>
+          <a:p>
+            <a:r>
+              <a:rPr lang="en-US" dirty="0"/>
+              <a:t>Using the value from the cost function as well as the computed derivatives for the specific layer, the weight and bias variables can now be updated</a:t>
+            </a:r>
+          </a:p>
+          <a:p>
+            <a:r>
+              <a:rPr lang="en-US" dirty="0"/>
+              <a:t>Essentially, partial derivatives are used t calculate the gradient, and this is used to update the parameter</a:t>
+            </a:r>
+          </a:p>
+          <a:p>
+            <a:pPr marL="0" indent="0">
+              <a:buNone/>
+            </a:pPr>
+            <a:endParaRPr lang="en-US" dirty="0"/>
+          </a:p>
+        </p:txBody>
+      </p:sp>
+      <p:pic>
+        <p:nvPicPr>
+          <p:cNvPr id="2054" name="Picture 6" descr="Related image">
+            <a:extLst>
+              <a:ext uri="{FF2B5EF4-FFF2-40B4-BE49-F238E27FC236}">
+                <a16:creationId xmlns:a16="http://schemas.microsoft.com/office/drawing/2014/main" id="{D6A20720-3209-4E8A-B108-B5AC17C4BFD7}"/>
+              </a:ext>
+            </a:extLst>
+          </p:cNvPr>
+          <p:cNvPicPr>
+            <a:picLocks noChangeAspect="1" noChangeArrowheads="1"/>
+          </p:cNvPicPr>
+          <p:nvPr/>
+        </p:nvPicPr>
+        <p:blipFill>
+          <a:blip r:embed="rId2">
+            <a:extLst>
+              <a:ext uri="{28A0092B-C50C-407E-A947-70E740481C1C}">
+                <a14:useLocalDpi xmlns:a14="http://schemas.microsoft.com/office/drawing/2010/main" val="0"/>
+              </a:ext>
+            </a:extLst>
+          </a:blip>
+          <a:srcRect/>
+          <a:stretch>
+            <a:fillRect/>
+          </a:stretch>
+        </p:blipFill>
+        <p:spPr bwMode="auto">
+          <a:xfrm>
+            <a:off x="3803725" y="4001294"/>
+            <a:ext cx="4954663" cy="2055495"/>
+          </a:xfrm>
+          <a:prstGeom prst="rect">
+            <a:avLst/>
+          </a:prstGeom>
+          <a:noFill/>
+          <a:extLst>
+            <a:ext uri="{909E8E84-426E-40DD-AFC4-6F175D3DCCD1}">
+              <a14:hiddenFill xmlns:a14="http://schemas.microsoft.com/office/drawing/2010/main">
+                <a:solidFill>
+                  <a:srgbClr val="FFFFFF"/>
+                </a:solidFill>
+              </a14:hiddenFill>
+            </a:ext>
+          </a:extLst>
+        </p:spPr>
+      </p:pic>
+    </p:spTree>
+    <p:extLst>
+      <p:ext uri="{BB962C8B-B14F-4D97-AF65-F5344CB8AC3E}">
+        <p14:creationId xmlns:p14="http://schemas.microsoft.com/office/powerpoint/2010/main" val="3959817650"/>
+      </p:ext>
+    </p:extLst>
+  </p:cSld>
+  <p:clrMapOvr>
+    <a:masterClrMapping/>
+  </p:clrMapOvr>
+</p:sld>
+</file>
+
+<file path=ppt/slides/slide17.xml><?xml version="1.0" encoding="utf-8"?>
+<p:sld xmlns:a="http://schemas.openxmlformats.org/drawingml/2006/main" xmlns:r="http://schemas.openxmlformats.org/officeDocument/2006/relationships" xmlns:p="http://schemas.openxmlformats.org/presentationml/2006/main">
+  <p:cSld>
+    <p:spTree>
+      <p:nvGrpSpPr>
+        <p:cNvPr id="1" name=""/>
+        <p:cNvGrpSpPr/>
+        <p:nvPr/>
+      </p:nvGrpSpPr>
+      <p:grpSpPr>
+        <a:xfrm>
+          <a:off x="0" y="0"/>
+          <a:ext cx="0" cy="0"/>
+          <a:chOff x="0" y="0"/>
+          <a:chExt cx="0" cy="0"/>
+        </a:xfrm>
+      </p:grpSpPr>
+      <p:sp>
+        <p:nvSpPr>
+          <p:cNvPr id="2" name="Title 1">
+            <a:extLst>
+              <a:ext uri="{FF2B5EF4-FFF2-40B4-BE49-F238E27FC236}">
+                <a16:creationId xmlns:a16="http://schemas.microsoft.com/office/drawing/2014/main" id="{F79C720F-6437-44AB-B7FD-E1F1C25BDB69}"/>
+              </a:ext>
+            </a:extLst>
+          </p:cNvPr>
+          <p:cNvSpPr>
+            <a:spLocks noGrp="1"/>
+          </p:cNvSpPr>
+          <p:nvPr>
+            <p:ph type="title"/>
+          </p:nvPr>
+        </p:nvSpPr>
+        <p:spPr/>
+        <p:txBody>
+          <a:bodyPr/>
+          <a:lstStyle/>
+          <a:p>
+            <a:r>
+              <a:rPr lang="en-US" dirty="0"/>
+              <a:t>Hyperparameters</a:t>
+            </a:r>
+          </a:p>
+        </p:txBody>
+      </p:sp>
+      <p:sp>
+        <p:nvSpPr>
+          <p:cNvPr id="3" name="Content Placeholder 2">
+            <a:extLst>
+              <a:ext uri="{FF2B5EF4-FFF2-40B4-BE49-F238E27FC236}">
+                <a16:creationId xmlns:a16="http://schemas.microsoft.com/office/drawing/2014/main" id="{8E397721-23AE-49AF-B6EC-E0F2F585EF93}"/>
+              </a:ext>
+            </a:extLst>
+          </p:cNvPr>
+          <p:cNvSpPr>
+            <a:spLocks noGrp="1"/>
+          </p:cNvSpPr>
+          <p:nvPr>
+            <p:ph idx="1"/>
+          </p:nvPr>
+        </p:nvSpPr>
+        <p:spPr/>
+        <p:txBody>
+          <a:bodyPr/>
+          <a:lstStyle/>
+          <a:p>
+            <a:r>
+              <a:rPr lang="en-US" dirty="0"/>
+              <a:t>Other than the weight and bias terms, there are also a few other aspects to training that are important to consider to get good accuracy of your model:</a:t>
+            </a:r>
+          </a:p>
+          <a:p>
+            <a:pPr lvl="2"/>
+            <a:r>
+              <a:rPr lang="en-US" dirty="0"/>
+              <a:t>Learning Rate α</a:t>
+            </a:r>
+          </a:p>
+          <a:p>
+            <a:pPr lvl="2"/>
+            <a:r>
+              <a:rPr lang="en-US" dirty="0"/>
+              <a:t>Number of Epochs</a:t>
+            </a:r>
+          </a:p>
+          <a:p>
+            <a:pPr lvl="2"/>
+            <a:r>
+              <a:rPr lang="en-US" dirty="0"/>
+              <a:t>Method of Initialization (weights and biases)</a:t>
+            </a:r>
+          </a:p>
+          <a:p>
+            <a:pPr lvl="2"/>
+            <a:r>
+              <a:rPr lang="en-US" dirty="0"/>
+              <a:t>Number of Nodes and Layers in Model</a:t>
+            </a:r>
+          </a:p>
+          <a:p>
+            <a:pPr lvl="2"/>
+            <a:r>
+              <a:rPr lang="en-US" dirty="0"/>
+              <a:t>Activation Functions</a:t>
+            </a:r>
+          </a:p>
+        </p:txBody>
+      </p:sp>
+    </p:spTree>
+    <p:extLst>
+      <p:ext uri="{BB962C8B-B14F-4D97-AF65-F5344CB8AC3E}">
+        <p14:creationId xmlns:p14="http://schemas.microsoft.com/office/powerpoint/2010/main" val="2873104609"/>
+      </p:ext>
+    </p:extLst>
+  </p:cSld>
+  <p:clrMapOvr>
+    <a:masterClrMapping/>
+  </p:clrMapOvr>
+</p:sld>
+</file>
+
+<file path=ppt/slides/slide18.xml><?xml version="1.0" encoding="utf-8"?>
+<p:sld xmlns:a="http://schemas.openxmlformats.org/drawingml/2006/main" xmlns:r="http://schemas.openxmlformats.org/officeDocument/2006/relationships" xmlns:p="http://schemas.openxmlformats.org/presentationml/2006/main">
+  <p:cSld>
+    <p:spTree>
+      <p:nvGrpSpPr>
+        <p:cNvPr id="1" name=""/>
+        <p:cNvGrpSpPr/>
+        <p:nvPr/>
+      </p:nvGrpSpPr>
+      <p:grpSpPr>
+        <a:xfrm>
+          <a:off x="0" y="0"/>
+          <a:ext cx="0" cy="0"/>
+          <a:chOff x="0" y="0"/>
+          <a:chExt cx="0" cy="0"/>
+        </a:xfrm>
+      </p:grpSpPr>
+      <p:sp>
+        <p:nvSpPr>
+          <p:cNvPr id="2" name="Title 1">
+            <a:extLst>
+              <a:ext uri="{FF2B5EF4-FFF2-40B4-BE49-F238E27FC236}">
+                <a16:creationId xmlns:a16="http://schemas.microsoft.com/office/drawing/2014/main" id="{5676E499-2383-4897-9029-779DABE9266B}"/>
+              </a:ext>
+            </a:extLst>
+          </p:cNvPr>
+          <p:cNvSpPr>
+            <a:spLocks noGrp="1"/>
+          </p:cNvSpPr>
+          <p:nvPr>
+            <p:ph type="title"/>
+          </p:nvPr>
+        </p:nvSpPr>
+        <p:spPr/>
+        <p:txBody>
+          <a:bodyPr/>
+          <a:lstStyle/>
+          <a:p>
+            <a:r>
+              <a:rPr lang="en-US" dirty="0"/>
+              <a:t>Resources</a:t>
+            </a:r>
+          </a:p>
+        </p:txBody>
+      </p:sp>
+      <p:sp>
+        <p:nvSpPr>
+          <p:cNvPr id="3" name="Content Placeholder 2">
+            <a:extLst>
+              <a:ext uri="{FF2B5EF4-FFF2-40B4-BE49-F238E27FC236}">
+                <a16:creationId xmlns:a16="http://schemas.microsoft.com/office/drawing/2014/main" id="{BD909E8A-FD72-4468-A12D-9354F3CC463C}"/>
+              </a:ext>
+            </a:extLst>
+          </p:cNvPr>
+          <p:cNvSpPr>
+            <a:spLocks noGrp="1"/>
+          </p:cNvSpPr>
+          <p:nvPr>
+            <p:ph idx="1"/>
+          </p:nvPr>
+        </p:nvSpPr>
+        <p:spPr/>
+        <p:txBody>
+          <a:bodyPr/>
+          <a:lstStyle/>
+          <a:p>
+            <a:r>
+              <a:rPr lang="en-US" dirty="0"/>
+              <a:t>Great </a:t>
+            </a:r>
+            <a:r>
+              <a:rPr lang="en-US" dirty="0" err="1"/>
+              <a:t>youtube</a:t>
+            </a:r>
+            <a:r>
+              <a:rPr lang="en-US" dirty="0"/>
+              <a:t> video: </a:t>
+            </a:r>
+            <a:r>
+              <a:rPr lang="en-US" dirty="0">
+                <a:hlinkClick r:id="rId2"/>
+              </a:rPr>
+              <a:t>https://bit.ly/2yQEKVP</a:t>
+            </a:r>
+            <a:endParaRPr lang="en-US" dirty="0"/>
+          </a:p>
+          <a:p>
+            <a:r>
+              <a:rPr lang="en-US" dirty="0"/>
+              <a:t>Article on Gradient Descent + Momentum: </a:t>
+            </a:r>
+            <a:r>
+              <a:rPr lang="en-US" dirty="0">
+                <a:hlinkClick r:id="rId3"/>
+              </a:rPr>
+              <a:t>https://bit.ly/2qsUUzS</a:t>
+            </a:r>
+            <a:endParaRPr lang="en-US" dirty="0"/>
+          </a:p>
+          <a:p>
+            <a:r>
+              <a:rPr lang="en-US" dirty="0"/>
+              <a:t>Great Blogger on Math Behind ML: </a:t>
+            </a:r>
+            <a:r>
+              <a:rPr lang="en-US" dirty="0">
+                <a:hlinkClick r:id="rId4"/>
+              </a:rPr>
+              <a:t>https://bit.ly/2j4kjME</a:t>
+            </a:r>
+            <a:endParaRPr lang="en-US" dirty="0"/>
+          </a:p>
+          <a:p>
+            <a:r>
+              <a:rPr lang="en-US" dirty="0"/>
+              <a:t>Article on SGD: </a:t>
+            </a:r>
+            <a:r>
+              <a:rPr lang="en-US" dirty="0">
+                <a:hlinkClick r:id="rId5"/>
+              </a:rPr>
+              <a:t>https://bit.ly/2LXKHEb</a:t>
+            </a:r>
+            <a:endParaRPr lang="en-US" dirty="0"/>
+          </a:p>
+          <a:p>
+            <a:r>
+              <a:rPr lang="en-US" dirty="0"/>
+              <a:t>Article on Loss Functions: </a:t>
+            </a:r>
+            <a:r>
+              <a:rPr lang="en-US" dirty="0">
+                <a:hlinkClick r:id="rId6"/>
+              </a:rPr>
+              <a:t>https://bit.ly/2o0BK3a</a:t>
+            </a:r>
+            <a:endParaRPr lang="en-US" dirty="0"/>
+          </a:p>
+          <a:p>
+            <a:endParaRPr lang="en-US" dirty="0"/>
+          </a:p>
+          <a:p>
+            <a:pPr marL="0" indent="0">
+              <a:buNone/>
+            </a:pPr>
+            <a:endParaRPr lang="en-US" dirty="0"/>
+          </a:p>
+        </p:txBody>
+      </p:sp>
+    </p:spTree>
+    <p:extLst>
+      <p:ext uri="{BB962C8B-B14F-4D97-AF65-F5344CB8AC3E}">
+        <p14:creationId xmlns:p14="http://schemas.microsoft.com/office/powerpoint/2010/main" val="3886145085"/>
+      </p:ext>
+    </p:extLst>
+  </p:cSld>
+  <p:clrMapOvr>
+    <a:masterClrMapping/>
+  </p:clrMapOvr>
+</p:sld>
+</file>
+
+<file path=ppt/slides/slide19.xml><?xml version="1.0" encoding="utf-8"?>
+<p:sld xmlns:a="http://schemas.openxmlformats.org/drawingml/2006/main" xmlns:r="http://schemas.openxmlformats.org/officeDocument/2006/relationships" xmlns:p="http://schemas.openxmlformats.org/presentationml/2006/main">
+  <p:cSld>
+    <p:spTree>
+      <p:nvGrpSpPr>
+        <p:cNvPr id="1" name=""/>
+        <p:cNvGrpSpPr/>
+        <p:nvPr/>
+      </p:nvGrpSpPr>
+      <p:grpSpPr>
+        <a:xfrm>
+          <a:off x="0" y="0"/>
+          <a:ext cx="0" cy="0"/>
+          <a:chOff x="0" y="0"/>
+          <a:chExt cx="0" cy="0"/>
+        </a:xfrm>
+      </p:grpSpPr>
+      <p:sp>
+        <p:nvSpPr>
+          <p:cNvPr id="2" name="Title 1">
+            <a:extLst>
+              <a:ext uri="{FF2B5EF4-FFF2-40B4-BE49-F238E27FC236}">
+                <a16:creationId xmlns:a16="http://schemas.microsoft.com/office/drawing/2014/main" id="{8D5509A8-CA65-4665-B91D-29C933BC3DEB}"/>
+              </a:ext>
+            </a:extLst>
+          </p:cNvPr>
+          <p:cNvSpPr>
+            <a:spLocks noGrp="1"/>
+          </p:cNvSpPr>
+          <p:nvPr>
+            <p:ph type="title"/>
+          </p:nvPr>
+        </p:nvSpPr>
+        <p:spPr>
+          <a:xfrm>
+            <a:off x="838200" y="1076960"/>
+            <a:ext cx="10515600" cy="4135119"/>
+          </a:xfrm>
+        </p:spPr>
+        <p:txBody>
+          <a:bodyPr/>
+          <a:lstStyle/>
+          <a:p>
+            <a:pPr algn="ctr"/>
+            <a:r>
+              <a:rPr lang="en-US" dirty="0"/>
+              <a:t>Second Part of Lesson:</a:t>
+            </a:r>
+            <a:br>
+              <a:rPr lang="en-US" dirty="0"/>
+            </a:br>
+            <a:r>
+              <a:rPr lang="en-US" dirty="0"/>
+              <a:t>Installation </a:t>
+            </a:r>
+          </a:p>
+        </p:txBody>
+      </p:sp>
+    </p:spTree>
+    <p:extLst>
+      <p:ext uri="{BB962C8B-B14F-4D97-AF65-F5344CB8AC3E}">
+        <p14:creationId xmlns:p14="http://schemas.microsoft.com/office/powerpoint/2010/main" val="3052846545"/>
+      </p:ext>
+    </p:extLst>
+  </p:cSld>
+  <p:clrMapOvr>
+    <a:masterClrMapping/>
+  </p:clrMapOvr>
+</p:sld>
+</file>
+
 <file path=ppt/slides/slide2.xml><?xml version="1.0" encoding="utf-8"?>
 <p:sld xmlns:a="http://schemas.openxmlformats.org/drawingml/2006/main" xmlns:r="http://schemas.openxmlformats.org/officeDocument/2006/relationships" xmlns:p="http://schemas.openxmlformats.org/presentationml/2006/main">
   <p:cSld>
@@ -3580,6 +5721,165 @@
     <p:extLst>
       <p:ext uri="{BB962C8B-B14F-4D97-AF65-F5344CB8AC3E}">
         <p14:creationId xmlns:p14="http://schemas.microsoft.com/office/powerpoint/2010/main" val="3629832111"/>
+      </p:ext>
+    </p:extLst>
+  </p:cSld>
+  <p:clrMapOvr>
+    <a:masterClrMapping/>
+  </p:clrMapOvr>
+</p:sld>
+</file>
+
+<file path=ppt/slides/slide20.xml><?xml version="1.0" encoding="utf-8"?>
+<p:sld xmlns:a="http://schemas.openxmlformats.org/drawingml/2006/main" xmlns:r="http://schemas.openxmlformats.org/officeDocument/2006/relationships" xmlns:p="http://schemas.openxmlformats.org/presentationml/2006/main">
+  <p:cSld>
+    <p:spTree>
+      <p:nvGrpSpPr>
+        <p:cNvPr id="1" name=""/>
+        <p:cNvGrpSpPr/>
+        <p:nvPr/>
+      </p:nvGrpSpPr>
+      <p:grpSpPr>
+        <a:xfrm>
+          <a:off x="0" y="0"/>
+          <a:ext cx="0" cy="0"/>
+          <a:chOff x="0" y="0"/>
+          <a:chExt cx="0" cy="0"/>
+        </a:xfrm>
+      </p:grpSpPr>
+      <p:sp>
+        <p:nvSpPr>
+          <p:cNvPr id="2" name="Title 1">
+            <a:extLst>
+              <a:ext uri="{FF2B5EF4-FFF2-40B4-BE49-F238E27FC236}">
+                <a16:creationId xmlns:a16="http://schemas.microsoft.com/office/drawing/2014/main" id="{EDE3DF1E-EBF0-4D81-A0DD-751F4B856C9B}"/>
+              </a:ext>
+            </a:extLst>
+          </p:cNvPr>
+          <p:cNvSpPr>
+            <a:spLocks noGrp="1"/>
+          </p:cNvSpPr>
+          <p:nvPr>
+            <p:ph type="title"/>
+          </p:nvPr>
+        </p:nvSpPr>
+        <p:spPr/>
+        <p:txBody>
+          <a:bodyPr/>
+          <a:lstStyle/>
+          <a:p>
+            <a:r>
+              <a:rPr lang="en-US" dirty="0"/>
+              <a:t>Setup for Programming Lesson:</a:t>
+            </a:r>
+          </a:p>
+        </p:txBody>
+      </p:sp>
+      <p:sp>
+        <p:nvSpPr>
+          <p:cNvPr id="3" name="Content Placeholder 2">
+            <a:extLst>
+              <a:ext uri="{FF2B5EF4-FFF2-40B4-BE49-F238E27FC236}">
+                <a16:creationId xmlns:a16="http://schemas.microsoft.com/office/drawing/2014/main" id="{65699A1A-C9FA-4DA2-8A3F-553E6026E7D0}"/>
+              </a:ext>
+            </a:extLst>
+          </p:cNvPr>
+          <p:cNvSpPr>
+            <a:spLocks noGrp="1"/>
+          </p:cNvSpPr>
+          <p:nvPr>
+            <p:ph idx="1"/>
+          </p:nvPr>
+        </p:nvSpPr>
+        <p:spPr/>
+        <p:txBody>
+          <a:bodyPr/>
+          <a:lstStyle/>
+          <a:p>
+            <a:r>
+              <a:rPr lang="en-US" dirty="0"/>
+              <a:t>Adding python to path (3.5.0+)</a:t>
+            </a:r>
+          </a:p>
+          <a:p>
+            <a:r>
+              <a:rPr lang="en-US" dirty="0"/>
+              <a:t>From command line:</a:t>
+            </a:r>
+          </a:p>
+          <a:p>
+            <a:pPr lvl="1"/>
+            <a:r>
+              <a:rPr lang="en-US" dirty="0"/>
+              <a:t>Pip install </a:t>
+            </a:r>
+            <a:r>
+              <a:rPr lang="en-US" dirty="0" err="1"/>
+              <a:t>tensorflow</a:t>
+            </a:r>
+            <a:endParaRPr lang="en-US" dirty="0"/>
+          </a:p>
+          <a:p>
+            <a:pPr lvl="1"/>
+            <a:r>
+              <a:rPr lang="en-US" dirty="0"/>
+              <a:t>Pip install matplotlib</a:t>
+            </a:r>
+          </a:p>
+          <a:p>
+            <a:pPr lvl="1"/>
+            <a:r>
+              <a:rPr lang="en-US" dirty="0"/>
+              <a:t>Pip install </a:t>
+            </a:r>
+            <a:r>
+              <a:rPr lang="en-US" dirty="0" err="1"/>
+              <a:t>keras</a:t>
+            </a:r>
+            <a:endParaRPr lang="en-US" dirty="0"/>
+          </a:p>
+          <a:p>
+            <a:pPr lvl="1"/>
+            <a:r>
+              <a:rPr lang="en-US" dirty="0"/>
+              <a:t>Pip install </a:t>
+            </a:r>
+            <a:r>
+              <a:rPr lang="en-US" dirty="0" err="1"/>
+              <a:t>jupyter</a:t>
+            </a:r>
+            <a:endParaRPr lang="en-US" dirty="0"/>
+          </a:p>
+          <a:p>
+            <a:pPr lvl="1"/>
+            <a:r>
+              <a:rPr lang="en-US" dirty="0"/>
+              <a:t>Pip install </a:t>
+            </a:r>
+            <a:r>
+              <a:rPr lang="en-US" dirty="0" err="1"/>
+              <a:t>opencv</a:t>
+            </a:r>
+            <a:r>
+              <a:rPr lang="en-US" dirty="0"/>
+              <a:t>-python</a:t>
+            </a:r>
+          </a:p>
+          <a:p>
+            <a:pPr marL="457200" lvl="1" indent="0">
+              <a:buNone/>
+            </a:pPr>
+            <a:endParaRPr lang="en-US" dirty="0"/>
+          </a:p>
+          <a:p>
+            <a:endParaRPr lang="en-US" dirty="0"/>
+          </a:p>
+        </p:txBody>
+      </p:sp>
+    </p:spTree>
+    <p:extLst>
+      <p:ext uri="{BB962C8B-B14F-4D97-AF65-F5344CB8AC3E}">
+        <p14:creationId xmlns:p14="http://schemas.microsoft.com/office/powerpoint/2010/main" val="879473253"/>
       </p:ext>
     </p:extLst>
   </p:cSld>
@@ -3760,35 +6060,61 @@
           <a:bodyPr/>
           <a:lstStyle/>
           <a:p>
-            <a:endParaRPr lang="en-US"/>
-          </a:p>
-        </p:txBody>
-      </p:sp>
-      <p:sp>
-        <p:nvSpPr>
-          <p:cNvPr id="3" name="Content Placeholder 2">
-            <a:extLst>
-              <a:ext uri="{FF2B5EF4-FFF2-40B4-BE49-F238E27FC236}">
-                <a16:creationId xmlns:a16="http://schemas.microsoft.com/office/drawing/2014/main" id="{F9FCCD75-E57B-4AAD-B2ED-1EBE8E968B27}"/>
-              </a:ext>
-            </a:extLst>
-          </p:cNvPr>
-          <p:cNvSpPr>
-            <a:spLocks noGrp="1"/>
-          </p:cNvSpPr>
+            <a:r>
+              <a:rPr lang="en-US" dirty="0"/>
+              <a:t>How Does the Network Learn ?</a:t>
+            </a:r>
+          </a:p>
+        </p:txBody>
+      </p:sp>
+      <p:pic>
+        <p:nvPicPr>
+          <p:cNvPr id="4" name="Picture 2" descr="Image result for neural network layers">
+            <a:extLst>
+              <a:ext uri="{FF2B5EF4-FFF2-40B4-BE49-F238E27FC236}">
+                <a16:creationId xmlns:a16="http://schemas.microsoft.com/office/drawing/2014/main" id="{78B58DBF-520F-407E-9D3D-9770C77E18B5}"/>
+              </a:ext>
+            </a:extLst>
+          </p:cNvPr>
+          <p:cNvPicPr>
+            <a:picLocks noGrp="1" noChangeAspect="1" noChangeArrowheads="1"/>
+          </p:cNvPicPr>
           <p:nvPr>
             <p:ph idx="1"/>
           </p:nvPr>
-        </p:nvSpPr>
-        <p:spPr/>
-        <p:txBody>
-          <a:bodyPr/>
-          <a:lstStyle/>
-          <a:p>
-            <a:endParaRPr lang="en-US"/>
-          </a:p>
-        </p:txBody>
-      </p:sp>
+        </p:nvPicPr>
+        <p:blipFill>
+          <a:blip r:embed="rId3">
+            <a:extLst>
+              <a:ext uri="{28A0092B-C50C-407E-A947-70E740481C1C}">
+                <a14:useLocalDpi xmlns:a14="http://schemas.microsoft.com/office/drawing/2010/main" val="0"/>
+              </a:ext>
+            </a:extLst>
+          </a:blip>
+          <a:stretch>
+            <a:fillRect/>
+          </a:stretch>
+        </p:blipFill>
+        <p:spPr bwMode="auto">
+          <a:xfrm>
+            <a:off x="2769397" y="1825625"/>
+            <a:ext cx="6653205" cy="4351338"/>
+          </a:xfrm>
+          <a:prstGeom prst="rect">
+            <a:avLst/>
+          </a:prstGeom>
+          <a:noFill/>
+          <a:extLst>
+            <a:ext uri="{909E8E84-426E-40DD-AFC4-6F175D3DCCD1}">
+              <a14:hiddenFill xmlns:a14="http://schemas.microsoft.com/office/drawing/2010/main">
+                <a:solidFill>
+                  <a:srgbClr val="FFFFFF"/>
+                </a:solidFill>
+              </a14:hiddenFill>
+            </a:ext>
+          </a:extLst>
+        </p:spPr>
+      </p:pic>
     </p:spTree>
     <p:extLst>
       <p:ext uri="{BB962C8B-B14F-4D97-AF65-F5344CB8AC3E}">
@@ -3824,7 +6150,7 @@
           <p:cNvPr id="2" name="Title 1">
             <a:extLst>
               <a:ext uri="{FF2B5EF4-FFF2-40B4-BE49-F238E27FC236}">
-                <a16:creationId xmlns:a16="http://schemas.microsoft.com/office/drawing/2014/main" id="{5676E499-2383-4897-9029-779DABE9266B}"/>
+                <a16:creationId xmlns:a16="http://schemas.microsoft.com/office/drawing/2014/main" id="{44A50DAA-5C1B-482B-BEDC-BE4E66D5202A}"/>
               </a:ext>
             </a:extLst>
           </p:cNvPr>
@@ -3842,7 +6168,7 @@
           <a:p>
             <a:r>
               <a:rPr lang="en-US" dirty="0"/>
-              <a:t>Resources</a:t>
+              <a:t>Train Test Split</a:t>
             </a:r>
           </a:p>
         </p:txBody>
@@ -3852,7 +6178,7 @@
           <p:cNvPr id="3" name="Content Placeholder 2">
             <a:extLst>
               <a:ext uri="{FF2B5EF4-FFF2-40B4-BE49-F238E27FC236}">
-                <a16:creationId xmlns:a16="http://schemas.microsoft.com/office/drawing/2014/main" id="{BD909E8A-FD72-4468-A12D-9354F3CC463C}"/>
+                <a16:creationId xmlns:a16="http://schemas.microsoft.com/office/drawing/2014/main" id="{08BE3F26-A05F-4D26-958F-1CB4502EC252}"/>
               </a:ext>
             </a:extLst>
           </p:cNvPr>
@@ -3865,72 +6191,71 @@
         </p:nvSpPr>
         <p:spPr/>
         <p:txBody>
-          <a:bodyPr/>
-          <a:lstStyle/>
-          <a:p>
-            <a:r>
-              <a:rPr lang="en-US" dirty="0"/>
-              <a:t>Great </a:t>
-            </a:r>
-            <a:r>
-              <a:rPr lang="en-US" dirty="0" err="1"/>
-              <a:t>youtube</a:t>
-            </a:r>
-            <a:r>
-              <a:rPr lang="en-US" dirty="0"/>
-              <a:t> video: </a:t>
-            </a:r>
-            <a:r>
-              <a:rPr lang="en-US" dirty="0">
-                <a:hlinkClick r:id="rId2"/>
-              </a:rPr>
-              <a:t>https://bit.ly/2yQEKVP</a:t>
-            </a:r>
-            <a:endParaRPr lang="en-US" dirty="0"/>
-          </a:p>
-          <a:p>
-            <a:r>
-              <a:rPr lang="en-US" dirty="0"/>
-              <a:t>Article on Gradient Descent + Momentum: </a:t>
-            </a:r>
-            <a:r>
-              <a:rPr lang="en-US" dirty="0">
-                <a:hlinkClick r:id="rId3"/>
-              </a:rPr>
-              <a:t>https://bit.ly/2qsUUzS</a:t>
-            </a:r>
-            <a:endParaRPr lang="en-US" dirty="0"/>
-          </a:p>
-          <a:p>
-            <a:r>
-              <a:rPr lang="en-US" dirty="0"/>
-              <a:t>Great Blogger on Math Behind ML: </a:t>
-            </a:r>
-            <a:r>
-              <a:rPr lang="en-US" dirty="0">
-                <a:hlinkClick r:id="rId4"/>
-              </a:rPr>
-              <a:t>https://bit.ly/2j4kjME</a:t>
-            </a:r>
-            <a:endParaRPr lang="en-US" dirty="0"/>
-          </a:p>
-          <a:p>
-            <a:r>
-              <a:rPr lang="en-US" dirty="0"/>
-              <a:t>Article on SGD: </a:t>
-            </a:r>
-            <a:r>
-              <a:rPr lang="en-US" dirty="0">
-                <a:hlinkClick r:id="rId5"/>
-              </a:rPr>
-              <a:t>https://bit.ly/2LXKHEb</a:t>
-            </a:r>
-            <a:endParaRPr lang="en-US" dirty="0"/>
-          </a:p>
-          <a:p>
-            <a:pPr marL="0" indent="0">
-              <a:buNone/>
-            </a:pPr>
+          <a:bodyPr>
+            <a:normAutofit lnSpcReduction="10000"/>
+          </a:bodyPr>
+          <a:lstStyle/>
+          <a:p>
+            <a:r>
+              <a:rPr lang="en-US" dirty="0"/>
+              <a:t>To approach any ML problem, you will need a lot of data</a:t>
+            </a:r>
+          </a:p>
+          <a:p>
+            <a:r>
+              <a:rPr lang="en-US" dirty="0"/>
+              <a:t>Typically, for supervised learning problems, this data will contain the input features and corresponding label</a:t>
+            </a:r>
+          </a:p>
+          <a:p>
+            <a:r>
+              <a:rPr lang="en-US" dirty="0"/>
+              <a:t>It is common practice to randomize and then split data into 2 groups</a:t>
+            </a:r>
+          </a:p>
+          <a:p>
+            <a:pPr lvl="1"/>
+            <a:r>
+              <a:rPr lang="en-US" dirty="0"/>
+              <a:t>Train group (what algorithm will learn with)</a:t>
+            </a:r>
+          </a:p>
+          <a:p>
+            <a:pPr lvl="1"/>
+            <a:r>
+              <a:rPr lang="en-US" dirty="0"/>
+              <a:t>Test and/or Validation group (validate how algorithm is working on unseen data)</a:t>
+            </a:r>
+          </a:p>
+          <a:p>
+            <a:r>
+              <a:rPr lang="en-US" dirty="0"/>
+              <a:t>Different data splits depending on amount of data available</a:t>
+            </a:r>
+          </a:p>
+          <a:p>
+            <a:pPr lvl="1"/>
+            <a:r>
+              <a:rPr lang="en-US" dirty="0"/>
+              <a:t>70/30 : Train Test Split for medium size data (few thousand)</a:t>
+            </a:r>
+          </a:p>
+          <a:p>
+            <a:pPr lvl="1"/>
+            <a:r>
+              <a:rPr lang="en-US" dirty="0"/>
+              <a:t>70/15/15: Train Test Validation for medium size data</a:t>
+            </a:r>
+          </a:p>
+          <a:p>
+            <a:pPr lvl="1"/>
+            <a:r>
+              <a:rPr lang="en-US" dirty="0"/>
+              <a:t>90/5/5: Train Test Validation for large amounts of data</a:t>
+            </a:r>
+          </a:p>
+          <a:p>
+            <a:pPr lvl="1"/>
             <a:endParaRPr lang="en-US" dirty="0"/>
           </a:p>
         </p:txBody>
@@ -3938,7 +6263,7 @@
     </p:spTree>
     <p:extLst>
       <p:ext uri="{BB962C8B-B14F-4D97-AF65-F5344CB8AC3E}">
-        <p14:creationId xmlns:p14="http://schemas.microsoft.com/office/powerpoint/2010/main" val="3886145085"/>
+        <p14:creationId xmlns:p14="http://schemas.microsoft.com/office/powerpoint/2010/main" val="1305066997"/>
       </p:ext>
     </p:extLst>
   </p:cSld>
@@ -3970,7 +6295,7 @@
           <p:cNvPr id="2" name="Title 1">
             <a:extLst>
               <a:ext uri="{FF2B5EF4-FFF2-40B4-BE49-F238E27FC236}">
-                <a16:creationId xmlns:a16="http://schemas.microsoft.com/office/drawing/2014/main" id="{8D5509A8-CA65-4665-B91D-29C933BC3DEB}"/>
+                <a16:creationId xmlns:a16="http://schemas.microsoft.com/office/drawing/2014/main" id="{036730D6-2903-464A-9015-343CE59B35C8}"/>
               </a:ext>
             </a:extLst>
           </p:cNvPr>
@@ -3981,27 +6306,62 @@
             <p:ph type="title"/>
           </p:nvPr>
         </p:nvSpPr>
-        <p:spPr>
-          <a:xfrm>
-            <a:off x="838200" y="1076960"/>
-            <a:ext cx="10515600" cy="4135119"/>
-          </a:xfrm>
-        </p:spPr>
-        <p:txBody>
-          <a:bodyPr/>
-          <a:lstStyle/>
-          <a:p>
-            <a:pPr algn="ctr"/>
-            <a:r>
-              <a:rPr lang="en-US" dirty="0"/>
-              <a:t>Second Part of Lesson:</a:t>
-            </a:r>
-            <a:br>
-              <a:rPr lang="en-US" dirty="0"/>
-            </a:br>
-            <a:r>
-              <a:rPr lang="en-US" dirty="0"/>
-              <a:t>Installation </a:t>
+        <p:spPr/>
+        <p:txBody>
+          <a:bodyPr/>
+          <a:lstStyle/>
+          <a:p>
+            <a:r>
+              <a:rPr lang="en-US" dirty="0"/>
+              <a:t>Epoch and Training Batch</a:t>
+            </a:r>
+          </a:p>
+        </p:txBody>
+      </p:sp>
+      <p:sp>
+        <p:nvSpPr>
+          <p:cNvPr id="3" name="Content Placeholder 2">
+            <a:extLst>
+              <a:ext uri="{FF2B5EF4-FFF2-40B4-BE49-F238E27FC236}">
+                <a16:creationId xmlns:a16="http://schemas.microsoft.com/office/drawing/2014/main" id="{36F0636C-1321-4CDF-982A-EC528AF78111}"/>
+              </a:ext>
+            </a:extLst>
+          </p:cNvPr>
+          <p:cNvSpPr>
+            <a:spLocks noGrp="1"/>
+          </p:cNvSpPr>
+          <p:nvPr>
+            <p:ph idx="1"/>
+          </p:nvPr>
+        </p:nvSpPr>
+        <p:spPr/>
+        <p:txBody>
+          <a:bodyPr/>
+          <a:lstStyle/>
+          <a:p>
+            <a:r>
+              <a:rPr lang="en-US" dirty="0"/>
+              <a:t>An epoch is a single pass through </a:t>
+            </a:r>
+            <a:r>
+              <a:rPr lang="en-US" b="1" dirty="0"/>
+              <a:t>all</a:t>
+            </a:r>
+            <a:r>
+              <a:rPr lang="en-US" dirty="0"/>
+              <a:t> the training data</a:t>
+            </a:r>
+          </a:p>
+          <a:p>
+            <a:r>
+              <a:rPr lang="en-US" dirty="0"/>
+              <a:t>To improve upon learning, the data is subdivided into small groups called training batches</a:t>
+            </a:r>
+          </a:p>
+          <a:p>
+            <a:r>
+              <a:rPr lang="en-US" dirty="0"/>
+              <a:t>Training batches allow for updates to algorithm at a faster rate than through an entire epoch</a:t>
             </a:r>
           </a:p>
         </p:txBody>
@@ -4009,7 +6369,7 @@
     </p:spTree>
     <p:extLst>
       <p:ext uri="{BB962C8B-B14F-4D97-AF65-F5344CB8AC3E}">
-        <p14:creationId xmlns:p14="http://schemas.microsoft.com/office/powerpoint/2010/main" val="3052846545"/>
+        <p14:creationId xmlns:p14="http://schemas.microsoft.com/office/powerpoint/2010/main" val="1765906048"/>
       </p:ext>
     </p:extLst>
   </p:cSld>
@@ -4041,7 +6401,7 @@
           <p:cNvPr id="2" name="Title 1">
             <a:extLst>
               <a:ext uri="{FF2B5EF4-FFF2-40B4-BE49-F238E27FC236}">
-                <a16:creationId xmlns:a16="http://schemas.microsoft.com/office/drawing/2014/main" id="{0312FC47-14DA-49AB-BC6A-114BFFD2CD5A}"/>
+                <a16:creationId xmlns:a16="http://schemas.microsoft.com/office/drawing/2014/main" id="{EA15E00D-4864-495E-B05F-A9D2B07895B0}"/>
               </a:ext>
             </a:extLst>
           </p:cNvPr>
@@ -4059,55 +6419,63 @@
           <a:p>
             <a:r>
               <a:rPr lang="en-US" dirty="0"/>
-              <a:t>Setup Mac</a:t>
-            </a:r>
-          </a:p>
-        </p:txBody>
-      </p:sp>
-      <p:sp>
-        <p:nvSpPr>
-          <p:cNvPr id="3" name="Content Placeholder 2">
-            <a:extLst>
-              <a:ext uri="{FF2B5EF4-FFF2-40B4-BE49-F238E27FC236}">
-                <a16:creationId xmlns:a16="http://schemas.microsoft.com/office/drawing/2014/main" id="{80FE139B-74BB-4232-BECD-DA83B805AAD1}"/>
-              </a:ext>
-            </a:extLst>
-          </p:cNvPr>
-          <p:cNvSpPr>
-            <a:spLocks noGrp="1"/>
-          </p:cNvSpPr>
+              <a:t>Epoch and Training Batch Cont’d</a:t>
+            </a:r>
+          </a:p>
+        </p:txBody>
+      </p:sp>
+      <p:pic>
+        <p:nvPicPr>
+          <p:cNvPr id="4" name="Picture 2" descr="Image result for neural network layers">
+            <a:extLst>
+              <a:ext uri="{FF2B5EF4-FFF2-40B4-BE49-F238E27FC236}">
+                <a16:creationId xmlns:a16="http://schemas.microsoft.com/office/drawing/2014/main" id="{BA9DD014-1F2C-4AC3-A58B-C6BC26909FEA}"/>
+              </a:ext>
+            </a:extLst>
+          </p:cNvPr>
+          <p:cNvPicPr>
+            <a:picLocks noGrp="1" noChangeAspect="1" noChangeArrowheads="1"/>
+          </p:cNvPicPr>
           <p:nvPr>
             <p:ph idx="1"/>
           </p:nvPr>
-        </p:nvSpPr>
-        <p:spPr/>
-        <p:txBody>
-          <a:bodyPr/>
-          <a:lstStyle/>
-          <a:p>
-            <a:r>
-              <a:rPr lang="en-US" dirty="0"/>
-              <a:t>Install python if not already installed (3.5.0+)</a:t>
-            </a:r>
-          </a:p>
-          <a:p>
-            <a:r>
-              <a:rPr lang="en-US" dirty="0"/>
-              <a:t>Go to terminal and check if python3 is a valid command</a:t>
-            </a:r>
-          </a:p>
-          <a:p>
-            <a:r>
-              <a:rPr lang="en-US" dirty="0"/>
-              <a:t>Pip install required modules</a:t>
-            </a:r>
-          </a:p>
-        </p:txBody>
-      </p:sp>
+        </p:nvPicPr>
+        <p:blipFill>
+          <a:blip r:embed="rId3">
+            <a:extLst>
+              <a:ext uri="{28A0092B-C50C-407E-A947-70E740481C1C}">
+                <a14:useLocalDpi xmlns:a14="http://schemas.microsoft.com/office/drawing/2010/main" val="0"/>
+              </a:ext>
+            </a:extLst>
+          </a:blip>
+          <a:stretch>
+            <a:fillRect/>
+          </a:stretch>
+        </p:blipFill>
+        <p:spPr bwMode="auto">
+          <a:xfrm>
+            <a:off x="2769397" y="1825625"/>
+            <a:ext cx="6653205" cy="4351338"/>
+          </a:xfrm>
+          <a:prstGeom prst="rect">
+            <a:avLst/>
+          </a:prstGeom>
+          <a:noFill/>
+          <a:extLst>
+            <a:ext uri="{909E8E84-426E-40DD-AFC4-6F175D3DCCD1}">
+              <a14:hiddenFill xmlns:a14="http://schemas.microsoft.com/office/drawing/2010/main">
+                <a:solidFill>
+                  <a:srgbClr val="FFFFFF"/>
+                </a:solidFill>
+              </a14:hiddenFill>
+            </a:ext>
+          </a:extLst>
+        </p:spPr>
+      </p:pic>
     </p:spTree>
     <p:extLst>
       <p:ext uri="{BB962C8B-B14F-4D97-AF65-F5344CB8AC3E}">
-        <p14:creationId xmlns:p14="http://schemas.microsoft.com/office/powerpoint/2010/main" val="2587011049"/>
+        <p14:creationId xmlns:p14="http://schemas.microsoft.com/office/powerpoint/2010/main" val="3461775755"/>
       </p:ext>
     </p:extLst>
   </p:cSld>
@@ -4139,7 +6507,7 @@
           <p:cNvPr id="2" name="Title 1">
             <a:extLst>
               <a:ext uri="{FF2B5EF4-FFF2-40B4-BE49-F238E27FC236}">
-                <a16:creationId xmlns:a16="http://schemas.microsoft.com/office/drawing/2014/main" id="{EDE3DF1E-EBF0-4D81-A0DD-751F4B856C9B}"/>
+                <a16:creationId xmlns:a16="http://schemas.microsoft.com/office/drawing/2014/main" id="{7CCEB420-6532-4AB2-BD20-61B4AA43742A}"/>
               </a:ext>
             </a:extLst>
           </p:cNvPr>
@@ -4157,7 +6525,7 @@
           <a:p>
             <a:r>
               <a:rPr lang="en-US" dirty="0"/>
-              <a:t>Setup Windows:</a:t>
+              <a:t>Loss and Cost</a:t>
             </a:r>
           </a:p>
         </p:txBody>
@@ -4167,7 +6535,7 @@
           <p:cNvPr id="3" name="Content Placeholder 2">
             <a:extLst>
               <a:ext uri="{FF2B5EF4-FFF2-40B4-BE49-F238E27FC236}">
-                <a16:creationId xmlns:a16="http://schemas.microsoft.com/office/drawing/2014/main" id="{65699A1A-C9FA-4DA2-8A3F-553E6026E7D0}"/>
+                <a16:creationId xmlns:a16="http://schemas.microsoft.com/office/drawing/2014/main" id="{DB7BE144-D9DD-4D00-A9AD-103C1D2245E4}"/>
               </a:ext>
             </a:extLst>
           </p:cNvPr>
@@ -4185,63 +6553,55 @@
           <a:p>
             <a:r>
               <a:rPr lang="en-US" dirty="0"/>
-              <a:t>Adding python to path (3.5.0+)</a:t>
-            </a:r>
-          </a:p>
-          <a:p>
-            <a:r>
-              <a:rPr lang="en-US" dirty="0"/>
-              <a:t>Pip install </a:t>
-            </a:r>
-            <a:r>
-              <a:rPr lang="en-US" dirty="0" err="1"/>
-              <a:t>tensorflow</a:t>
-            </a:r>
-            <a:r>
-              <a:rPr lang="en-US" dirty="0"/>
-              <a:t> from command line</a:t>
-            </a:r>
-          </a:p>
-          <a:p>
-            <a:r>
-              <a:rPr lang="en-US" dirty="0"/>
-              <a:t>Pip install matplotlib</a:t>
-            </a:r>
-          </a:p>
-          <a:p>
-            <a:r>
-              <a:rPr lang="en-US" dirty="0"/>
-              <a:t>Pip install </a:t>
-            </a:r>
-            <a:r>
-              <a:rPr lang="en-US" dirty="0" err="1"/>
-              <a:t>keras</a:t>
-            </a:r>
-            <a:endParaRPr lang="en-US" dirty="0"/>
-          </a:p>
-          <a:p>
-            <a:r>
-              <a:rPr lang="en-US" dirty="0"/>
-              <a:t>Pip install </a:t>
-            </a:r>
-            <a:r>
-              <a:rPr lang="en-US" dirty="0" err="1"/>
-              <a:t>jupyter</a:t>
-            </a:r>
-            <a:endParaRPr lang="en-US" dirty="0"/>
-          </a:p>
-          <a:p>
-            <a:r>
-              <a:rPr lang="en-US" dirty="0"/>
-              <a:t>Pip install </a:t>
-            </a:r>
-            <a:r>
-              <a:rPr lang="en-US" dirty="0" err="1"/>
-              <a:t>opencv</a:t>
-            </a:r>
-            <a:r>
-              <a:rPr lang="en-US" dirty="0"/>
-              <a:t>-python</a:t>
+              <a:t>Loss (or error) function is used to determine how good </a:t>
+            </a:r>
+            <a:r>
+              <a:rPr lang="cy-GB" dirty="0"/>
+              <a:t>ŷ (predicted vale from algorithm’s output)</a:t>
+            </a:r>
+            <a:r>
+              <a:rPr lang="en-US" dirty="0"/>
+              <a:t> is in relation to </a:t>
+            </a:r>
+            <a:r>
+              <a:rPr lang="cy-GB" dirty="0"/>
+              <a:t>y (labeled value) on a single training example</a:t>
+            </a:r>
+          </a:p>
+          <a:p>
+            <a:r>
+              <a:rPr lang="cy-GB" dirty="0"/>
+              <a:t>Conversely cost, is the loss function applied to a group of data with their values averaged</a:t>
+            </a:r>
+          </a:p>
+          <a:p>
+            <a:r>
+              <a:rPr lang="cy-GB" dirty="0"/>
+              <a:t>These values are to be minimized over time as we want:</a:t>
+            </a:r>
+          </a:p>
+          <a:p>
+            <a:pPr marL="914400" lvl="2" indent="0">
+              <a:buNone/>
+            </a:pPr>
+            <a:r>
+              <a:rPr lang="cy-GB" dirty="0"/>
+              <a:t>			 ŷ </a:t>
+            </a:r>
+            <a:r>
+              <a:rPr lang="en-US" b="1" dirty="0"/>
+              <a:t>≈ </a:t>
+            </a:r>
+            <a:r>
+              <a:rPr lang="en-US" dirty="0"/>
+              <a:t>y</a:t>
+            </a:r>
+            <a:endParaRPr lang="cy-GB" dirty="0"/>
+          </a:p>
+          <a:p>
+            <a:r>
+              <a:rPr lang="cy-GB" dirty="0"/>
+              <a:t>There are many loss functions but we will briefly go over 2 most common ones.</a:t>
             </a:r>
           </a:p>
           <a:p>
@@ -4252,7 +6612,7 @@
     </p:spTree>
     <p:extLst>
       <p:ext uri="{BB962C8B-B14F-4D97-AF65-F5344CB8AC3E}">
-        <p14:creationId xmlns:p14="http://schemas.microsoft.com/office/powerpoint/2010/main" val="879473253"/>
+        <p14:creationId xmlns:p14="http://schemas.microsoft.com/office/powerpoint/2010/main" val="4007438207"/>
       </p:ext>
     </p:extLst>
   </p:cSld>
@@ -4284,7 +6644,7 @@
           <p:cNvPr id="2" name="Title 1">
             <a:extLst>
               <a:ext uri="{FF2B5EF4-FFF2-40B4-BE49-F238E27FC236}">
-                <a16:creationId xmlns:a16="http://schemas.microsoft.com/office/drawing/2014/main" id="{3AD95E31-F638-4D37-862D-BAC7B70649B7}"/>
+                <a16:creationId xmlns:a16="http://schemas.microsoft.com/office/drawing/2014/main" id="{24D0856F-2BD0-47D4-A16F-C2954D971F12}"/>
               </a:ext>
             </a:extLst>
           </p:cNvPr>
@@ -4300,39 +6660,411 @@
           <a:bodyPr/>
           <a:lstStyle/>
           <a:p>
-            <a:endParaRPr lang="en-US"/>
-          </a:p>
-        </p:txBody>
-      </p:sp>
-      <p:sp>
-        <p:nvSpPr>
-          <p:cNvPr id="3" name="Content Placeholder 2">
-            <a:extLst>
-              <a:ext uri="{FF2B5EF4-FFF2-40B4-BE49-F238E27FC236}">
-                <a16:creationId xmlns:a16="http://schemas.microsoft.com/office/drawing/2014/main" id="{401C14CF-57C8-49D0-A97B-84131558595A}"/>
-              </a:ext>
-            </a:extLst>
-          </p:cNvPr>
-          <p:cNvSpPr>
-            <a:spLocks noGrp="1"/>
-          </p:cNvSpPr>
-          <p:nvPr>
-            <p:ph idx="1"/>
-          </p:nvPr>
-        </p:nvSpPr>
-        <p:spPr/>
-        <p:txBody>
-          <a:bodyPr/>
-          <a:lstStyle/>
-          <a:p>
-            <a:endParaRPr lang="en-US"/>
-          </a:p>
-        </p:txBody>
-      </p:sp>
+            <a:r>
+              <a:rPr lang="en-US" dirty="0"/>
+              <a:t>Logarithmic (Log) Loss</a:t>
+            </a:r>
+          </a:p>
+        </p:txBody>
+      </p:sp>
+      <mc:AlternateContent xmlns:mc="http://schemas.openxmlformats.org/markup-compatibility/2006">
+        <mc:Choice xmlns:a14="http://schemas.microsoft.com/office/drawing/2010/main" Requires="a14">
+          <p:sp>
+            <p:nvSpPr>
+              <p:cNvPr id="3" name="Content Placeholder 2">
+                <a:extLst>
+                  <a:ext uri="{FF2B5EF4-FFF2-40B4-BE49-F238E27FC236}">
+                    <a16:creationId xmlns:a16="http://schemas.microsoft.com/office/drawing/2014/main" id="{BD2C5A33-C1B4-44DE-BD96-3EA94305A6B5}"/>
+                  </a:ext>
+                </a:extLst>
+              </p:cNvPr>
+              <p:cNvSpPr>
+                <a:spLocks noGrp="1"/>
+              </p:cNvSpPr>
+              <p:nvPr>
+                <p:ph idx="1"/>
+              </p:nvPr>
+            </p:nvSpPr>
+            <p:spPr/>
+            <p:txBody>
+              <a:bodyPr/>
+              <a:lstStyle/>
+              <a:p>
+                <a:r>
+                  <a:rPr lang="en-US" dirty="0"/>
+                  <a:t>Log Loss quantifies the accuracy of a classifier by </a:t>
+                </a:r>
+                <a:r>
+                  <a:rPr lang="en-US" dirty="0" err="1"/>
+                  <a:t>penalising</a:t>
+                </a:r>
+                <a:r>
+                  <a:rPr lang="en-US" dirty="0"/>
+                  <a:t> false classifications</a:t>
+                </a:r>
+              </a:p>
+              <a:p>
+                <a:r>
+                  <a:rPr lang="en-US" dirty="0" err="1"/>
+                  <a:t>Minimising</a:t>
+                </a:r>
+                <a:r>
+                  <a:rPr lang="en-US" dirty="0"/>
+                  <a:t> the Log Loss is basically equivalent to </a:t>
+                </a:r>
+                <a:r>
+                  <a:rPr lang="en-US" dirty="0" err="1"/>
+                  <a:t>maximising</a:t>
+                </a:r>
+                <a:r>
+                  <a:rPr lang="en-US" dirty="0"/>
+                  <a:t> the accuracy of the classifier</a:t>
+                </a:r>
+              </a:p>
+              <a:p>
+                <a:r>
+                  <a:rPr lang="en-US" dirty="0"/>
+                  <a:t>When there are two classes the following is used:</a:t>
+                </a:r>
+              </a:p>
+              <a:p>
+                <a:pPr marL="457200" lvl="1" indent="0">
+                  <a:buNone/>
+                </a:pPr>
+                <a14:m>
+                  <m:oMathPara xmlns:m="http://schemas.openxmlformats.org/officeDocument/2006/math">
+                    <m:oMathParaPr>
+                      <m:jc m:val="centerGroup"/>
+                    </m:oMathParaPr>
+                    <m:oMath xmlns:m="http://schemas.openxmlformats.org/officeDocument/2006/math">
+                      <m:r>
+                        <a:rPr lang="en-US" b="0" i="1" smtClean="0">
+                          <a:latin typeface="Cambria Math" panose="02040503050406030204" pitchFamily="18" charset="0"/>
+                        </a:rPr>
+                        <m:t>𝐿𝑜𝑔</m:t>
+                      </m:r>
+                      <m:r>
+                        <a:rPr lang="en-US" b="0" i="1" smtClean="0">
+                          <a:latin typeface="Cambria Math" panose="02040503050406030204" pitchFamily="18" charset="0"/>
+                        </a:rPr>
+                        <m:t>= </m:t>
+                      </m:r>
+                      <m:f>
+                        <m:fPr>
+                          <m:ctrlPr>
+                            <a:rPr lang="en-US" b="0" i="1" smtClean="0">
+                              <a:latin typeface="Cambria Math" panose="02040503050406030204" pitchFamily="18" charset="0"/>
+                            </a:rPr>
+                          </m:ctrlPr>
+                        </m:fPr>
+                        <m:num>
+                          <m:r>
+                            <a:rPr lang="en-US" b="0" i="1" smtClean="0">
+                              <a:latin typeface="Cambria Math" panose="02040503050406030204" pitchFamily="18" charset="0"/>
+                            </a:rPr>
+                            <m:t>−1</m:t>
+                          </m:r>
+                        </m:num>
+                        <m:den>
+                          <m:r>
+                            <a:rPr lang="en-US" b="0" i="1" smtClean="0">
+                              <a:latin typeface="Cambria Math" panose="02040503050406030204" pitchFamily="18" charset="0"/>
+                            </a:rPr>
+                            <m:t>𝑁</m:t>
+                          </m:r>
+                        </m:den>
+                      </m:f>
+                      <m:nary>
+                        <m:naryPr>
+                          <m:chr m:val="∑"/>
+                          <m:ctrlPr>
+                            <a:rPr lang="en-US" b="0" i="1" smtClean="0">
+                              <a:latin typeface="Cambria Math" panose="02040503050406030204" pitchFamily="18" charset="0"/>
+                            </a:rPr>
+                          </m:ctrlPr>
+                        </m:naryPr>
+                        <m:sub>
+                          <m:r>
+                            <m:rPr>
+                              <m:brk m:alnAt="23"/>
+                            </m:rPr>
+                            <a:rPr lang="en-US" b="0" i="1" smtClean="0">
+                              <a:latin typeface="Cambria Math" panose="02040503050406030204" pitchFamily="18" charset="0"/>
+                            </a:rPr>
+                            <m:t>𝑖</m:t>
+                          </m:r>
+                          <m:r>
+                            <a:rPr lang="en-US" b="0" i="1" smtClean="0">
+                              <a:latin typeface="Cambria Math" panose="02040503050406030204" pitchFamily="18" charset="0"/>
+                            </a:rPr>
+                            <m:t>=1</m:t>
+                          </m:r>
+                        </m:sub>
+                        <m:sup>
+                          <m:r>
+                            <a:rPr lang="en-US" b="0" i="1" smtClean="0">
+                              <a:latin typeface="Cambria Math" panose="02040503050406030204" pitchFamily="18" charset="0"/>
+                            </a:rPr>
+                            <m:t>𝑁</m:t>
+                          </m:r>
+                        </m:sup>
+                        <m:e>
+                          <m:r>
+                            <a:rPr lang="en-US" b="0" i="1" smtClean="0">
+                              <a:latin typeface="Cambria Math" panose="02040503050406030204" pitchFamily="18" charset="0"/>
+                            </a:rPr>
+                            <m:t>[</m:t>
+                          </m:r>
+                          <m:sSub>
+                            <m:sSubPr>
+                              <m:ctrlPr>
+                                <a:rPr lang="en-US" b="0" i="1" smtClean="0">
+                                  <a:latin typeface="Cambria Math" panose="02040503050406030204" pitchFamily="18" charset="0"/>
+                                </a:rPr>
+                              </m:ctrlPr>
+                            </m:sSubPr>
+                            <m:e>
+                              <m:r>
+                                <a:rPr lang="en-US" b="0" i="1" smtClean="0">
+                                  <a:latin typeface="Cambria Math" panose="02040503050406030204" pitchFamily="18" charset="0"/>
+                                </a:rPr>
+                                <m:t>𝑦</m:t>
+                              </m:r>
+                            </m:e>
+                            <m:sub>
+                              <m:r>
+                                <a:rPr lang="en-US" b="0" i="1" smtClean="0">
+                                  <a:latin typeface="Cambria Math" panose="02040503050406030204" pitchFamily="18" charset="0"/>
+                                </a:rPr>
+                                <m:t>𝑖</m:t>
+                              </m:r>
+                            </m:sub>
+                          </m:sSub>
+                          <m:r>
+                            <a:rPr lang="en-US" b="0" i="1" smtClean="0">
+                              <a:latin typeface="Cambria Math" panose="02040503050406030204" pitchFamily="18" charset="0"/>
+                              <a:ea typeface="Cambria Math" panose="02040503050406030204" pitchFamily="18" charset="0"/>
+                            </a:rPr>
+                            <m:t>∙</m:t>
+                          </m:r>
+                          <m:func>
+                            <m:funcPr>
+                              <m:ctrlPr>
+                                <a:rPr lang="en-US" b="0" i="1" smtClean="0">
+                                  <a:latin typeface="Cambria Math" panose="02040503050406030204" pitchFamily="18" charset="0"/>
+                                  <a:ea typeface="Cambria Math" panose="02040503050406030204" pitchFamily="18" charset="0"/>
+                                </a:rPr>
+                              </m:ctrlPr>
+                            </m:funcPr>
+                            <m:fName>
+                              <m:r>
+                                <m:rPr>
+                                  <m:sty m:val="p"/>
+                                </m:rPr>
+                                <a:rPr lang="en-US" b="0" i="0" smtClean="0">
+                                  <a:latin typeface="Cambria Math" panose="02040503050406030204" pitchFamily="18" charset="0"/>
+                                  <a:ea typeface="Cambria Math" panose="02040503050406030204" pitchFamily="18" charset="0"/>
+                                </a:rPr>
+                                <m:t>log</m:t>
+                              </m:r>
+                            </m:fName>
+                            <m:e>
+                              <m:d>
+                                <m:dPr>
+                                  <m:ctrlPr>
+                                    <a:rPr lang="en-US" i="1">
+                                      <a:latin typeface="Cambria Math" panose="02040503050406030204" pitchFamily="18" charset="0"/>
+                                      <a:ea typeface="Cambria Math" panose="02040503050406030204" pitchFamily="18" charset="0"/>
+                                    </a:rPr>
+                                  </m:ctrlPr>
+                                </m:dPr>
+                                <m:e>
+                                  <m:sSub>
+                                    <m:sSubPr>
+                                      <m:ctrlPr>
+                                        <a:rPr lang="en-US" i="1" smtClean="0">
+                                          <a:latin typeface="Cambria Math" panose="02040503050406030204" pitchFamily="18" charset="0"/>
+                                          <a:ea typeface="Cambria Math" panose="02040503050406030204" pitchFamily="18" charset="0"/>
+                                        </a:rPr>
+                                      </m:ctrlPr>
+                                    </m:sSubPr>
+                                    <m:e>
+                                      <m:r>
+                                        <a:rPr lang="cy-GB" i="1">
+                                          <a:latin typeface="Cambria Math" panose="02040503050406030204" pitchFamily="18" charset="0"/>
+                                          <a:ea typeface="Cambria Math" panose="02040503050406030204" pitchFamily="18" charset="0"/>
+                                        </a:rPr>
+                                        <m:t>ŷ</m:t>
+                                      </m:r>
+                                    </m:e>
+                                    <m:sub>
+                                      <m:r>
+                                        <a:rPr lang="en-US" b="0" i="1" smtClean="0">
+                                          <a:latin typeface="Cambria Math" panose="02040503050406030204" pitchFamily="18" charset="0"/>
+                                          <a:ea typeface="Cambria Math" panose="02040503050406030204" pitchFamily="18" charset="0"/>
+                                        </a:rPr>
+                                        <m:t>𝑖</m:t>
+                                      </m:r>
+                                    </m:sub>
+                                  </m:sSub>
+                                </m:e>
+                              </m:d>
+                            </m:e>
+                          </m:func>
+                          <m:r>
+                            <a:rPr lang="en-US" b="0" i="1" smtClean="0">
+                              <a:latin typeface="Cambria Math" panose="02040503050406030204" pitchFamily="18" charset="0"/>
+                              <a:ea typeface="Cambria Math" panose="02040503050406030204" pitchFamily="18" charset="0"/>
+                            </a:rPr>
+                            <m:t>+(1 −</m:t>
+                          </m:r>
+                          <m:sSub>
+                            <m:sSubPr>
+                              <m:ctrlPr>
+                                <a:rPr lang="en-US" b="0" i="1" smtClean="0">
+                                  <a:latin typeface="Cambria Math" panose="02040503050406030204" pitchFamily="18" charset="0"/>
+                                  <a:ea typeface="Cambria Math" panose="02040503050406030204" pitchFamily="18" charset="0"/>
+                                </a:rPr>
+                              </m:ctrlPr>
+                            </m:sSubPr>
+                            <m:e>
+                              <m:r>
+                                <a:rPr lang="en-US" b="0" i="1" smtClean="0">
+                                  <a:latin typeface="Cambria Math" panose="02040503050406030204" pitchFamily="18" charset="0"/>
+                                  <a:ea typeface="Cambria Math" panose="02040503050406030204" pitchFamily="18" charset="0"/>
+                                </a:rPr>
+                                <m:t>𝑦</m:t>
+                              </m:r>
+                            </m:e>
+                            <m:sub>
+                              <m:r>
+                                <a:rPr lang="en-US" b="0" i="1" smtClean="0">
+                                  <a:latin typeface="Cambria Math" panose="02040503050406030204" pitchFamily="18" charset="0"/>
+                                  <a:ea typeface="Cambria Math" panose="02040503050406030204" pitchFamily="18" charset="0"/>
+                                </a:rPr>
+                                <m:t>𝑖</m:t>
+                              </m:r>
+                            </m:sub>
+                          </m:sSub>
+                          <m:r>
+                            <a:rPr lang="en-US" b="0" i="1" smtClean="0">
+                              <a:latin typeface="Cambria Math" panose="02040503050406030204" pitchFamily="18" charset="0"/>
+                              <a:ea typeface="Cambria Math" panose="02040503050406030204" pitchFamily="18" charset="0"/>
+                            </a:rPr>
+                            <m:t>)∙</m:t>
+                          </m:r>
+                          <m:r>
+                            <m:rPr>
+                              <m:sty m:val="p"/>
+                            </m:rPr>
+                            <a:rPr lang="en-US" b="0" i="0" smtClean="0">
+                              <a:latin typeface="Cambria Math" panose="02040503050406030204" pitchFamily="18" charset="0"/>
+                              <a:ea typeface="Cambria Math" panose="02040503050406030204" pitchFamily="18" charset="0"/>
+                            </a:rPr>
+                            <m:t>log</m:t>
+                          </m:r>
+                          <m:r>
+                            <a:rPr lang="en-US" b="0" i="1" smtClean="0">
+                              <a:latin typeface="Cambria Math" panose="02040503050406030204" pitchFamily="18" charset="0"/>
+                              <a:ea typeface="Cambria Math" panose="02040503050406030204" pitchFamily="18" charset="0"/>
+                            </a:rPr>
+                            <m:t>⁡(1 − </m:t>
+                          </m:r>
+                          <m:sSub>
+                            <m:sSubPr>
+                              <m:ctrlPr>
+                                <a:rPr lang="en-US" b="0" i="1" smtClean="0">
+                                  <a:latin typeface="Cambria Math" panose="02040503050406030204" pitchFamily="18" charset="0"/>
+                                  <a:ea typeface="Cambria Math" panose="02040503050406030204" pitchFamily="18" charset="0"/>
+                                </a:rPr>
+                              </m:ctrlPr>
+                            </m:sSubPr>
+                            <m:e>
+                              <m:r>
+                                <a:rPr lang="cy-GB" i="1">
+                                  <a:latin typeface="Cambria Math" panose="02040503050406030204" pitchFamily="18" charset="0"/>
+                                  <a:ea typeface="Cambria Math" panose="02040503050406030204" pitchFamily="18" charset="0"/>
+                                </a:rPr>
+                                <m:t>ŷ</m:t>
+                              </m:r>
+                            </m:e>
+                            <m:sub>
+                              <m:r>
+                                <a:rPr lang="en-US" b="0" i="1" smtClean="0">
+                                  <a:latin typeface="Cambria Math" panose="02040503050406030204" pitchFamily="18" charset="0"/>
+                                  <a:ea typeface="Cambria Math" panose="02040503050406030204" pitchFamily="18" charset="0"/>
+                                </a:rPr>
+                                <m:t>𝑖</m:t>
+                              </m:r>
+                            </m:sub>
+                          </m:sSub>
+                          <m:r>
+                            <a:rPr lang="en-US" b="0" i="1" smtClean="0">
+                              <a:latin typeface="Cambria Math" panose="02040503050406030204" pitchFamily="18" charset="0"/>
+                              <a:ea typeface="Cambria Math" panose="02040503050406030204" pitchFamily="18" charset="0"/>
+                            </a:rPr>
+                            <m:t>)</m:t>
+                          </m:r>
+                          <m:r>
+                            <a:rPr lang="en-US" b="0" i="1" smtClean="0">
+                              <a:latin typeface="Cambria Math" panose="02040503050406030204" pitchFamily="18" charset="0"/>
+                            </a:rPr>
+                            <m:t>]</m:t>
+                          </m:r>
+                        </m:e>
+                      </m:nary>
+                    </m:oMath>
+                  </m:oMathPara>
+                </a14:m>
+                <a:endParaRPr lang="en-US" dirty="0"/>
+              </a:p>
+            </p:txBody>
+          </p:sp>
+        </mc:Choice>
+        <mc:Fallback>
+          <p:sp>
+            <p:nvSpPr>
+              <p:cNvPr id="3" name="Content Placeholder 2">
+                <a:extLst>
+                  <a:ext uri="{FF2B5EF4-FFF2-40B4-BE49-F238E27FC236}">
+                    <a16:creationId xmlns:a16="http://schemas.microsoft.com/office/drawing/2014/main" id="{BD2C5A33-C1B4-44DE-BD96-3EA94305A6B5}"/>
+                  </a:ext>
+                </a:extLst>
+              </p:cNvPr>
+              <p:cNvSpPr>
+                <a:spLocks noGrp="1" noRot="1" noChangeAspect="1" noMove="1" noResize="1" noEditPoints="1" noAdjustHandles="1" noChangeArrowheads="1" noChangeShapeType="1" noTextEdit="1"/>
+              </p:cNvSpPr>
+              <p:nvPr>
+                <p:ph idx="1"/>
+              </p:nvPr>
+            </p:nvSpPr>
+            <p:spPr>
+              <a:blipFill>
+                <a:blip r:embed="rId2"/>
+                <a:stretch>
+                  <a:fillRect l="-1043" t="-2241"/>
+                </a:stretch>
+              </a:blipFill>
+            </p:spPr>
+            <p:txBody>
+              <a:bodyPr/>
+              <a:lstStyle/>
+              <a:p>
+                <a:r>
+                  <a:rPr lang="en-US">
+                    <a:noFill/>
+                  </a:rPr>
+                  <a:t> </a:t>
+                </a:r>
+              </a:p>
+            </p:txBody>
+          </p:sp>
+        </mc:Fallback>
+      </mc:AlternateContent>
     </p:spTree>
     <p:extLst>
       <p:ext uri="{BB962C8B-B14F-4D97-AF65-F5344CB8AC3E}">
-        <p14:creationId xmlns:p14="http://schemas.microsoft.com/office/powerpoint/2010/main" val="3230342614"/>
+        <p14:creationId xmlns:p14="http://schemas.microsoft.com/office/powerpoint/2010/main" val="2470327581"/>
       </p:ext>
     </p:extLst>
   </p:cSld>
@@ -4635,4 +7367,299 @@
     </a:ext>
   </a:extLst>
 </a:theme>
+</file>
+
+<file path=ppt/theme/theme2.xml><?xml version="1.0" encoding="utf-8"?>
+<a:theme xmlns:a="http://schemas.openxmlformats.org/drawingml/2006/main" name="Office Theme">
+  <a:themeElements>
+    <a:clrScheme name="Office">
+      <a:dk1>
+        <a:sysClr val="windowText" lastClr="000000"/>
+      </a:dk1>
+      <a:lt1>
+        <a:sysClr val="window" lastClr="FFFFFF"/>
+      </a:lt1>
+      <a:dk2>
+        <a:srgbClr val="44546A"/>
+      </a:dk2>
+      <a:lt2>
+        <a:srgbClr val="E7E6E6"/>
+      </a:lt2>
+      <a:accent1>
+        <a:srgbClr val="4472C4"/>
+      </a:accent1>
+      <a:accent2>
+        <a:srgbClr val="ED7D31"/>
+      </a:accent2>
+      <a:accent3>
+        <a:srgbClr val="A5A5A5"/>
+      </a:accent3>
+      <a:accent4>
+        <a:srgbClr val="FFC000"/>
+      </a:accent4>
+      <a:accent5>
+        <a:srgbClr val="5B9BD5"/>
+      </a:accent5>
+      <a:accent6>
+        <a:srgbClr val="70AD47"/>
+      </a:accent6>
+      <a:hlink>
+        <a:srgbClr val="0563C1"/>
+      </a:hlink>
+      <a:folHlink>
+        <a:srgbClr val="954F72"/>
+      </a:folHlink>
+    </a:clrScheme>
+    <a:fontScheme name="Office">
+      <a:majorFont>
+        <a:latin typeface="Calibri Light" panose="020F0302020204030204"/>
+        <a:ea typeface=""/>
+        <a:cs typeface=""/>
+        <a:font script="Jpan" typeface="游ゴシック Light"/>
+        <a:font script="Hang" typeface="맑은 고딕"/>
+        <a:font script="Hans" typeface="等线 Light"/>
+        <a:font script="Hant" typeface="新細明體"/>
+        <a:font script="Arab" typeface="Times New Roman"/>
+        <a:font script="Hebr" typeface="Times New Roman"/>
+        <a:font script="Thai" typeface="Angsana New"/>
+        <a:font script="Ethi" typeface="Nyala"/>
+        <a:font script="Beng" typeface="Vrinda"/>
+        <a:font script="Gujr" typeface="Shruti"/>
+        <a:font script="Khmr" typeface="MoolBoran"/>
+        <a:font script="Knda" typeface="Tunga"/>
+        <a:font script="Guru" typeface="Raavi"/>
+        <a:font script="Cans" typeface="Euphemia"/>
+        <a:font script="Cher" typeface="Plantagenet Cherokee"/>
+        <a:font script="Yiii" typeface="Microsoft Yi Baiti"/>
+        <a:font script="Tibt" typeface="Microsoft Himalaya"/>
+        <a:font script="Thaa" typeface="MV Boli"/>
+        <a:font script="Deva" typeface="Mangal"/>
+        <a:font script="Telu" typeface="Gautami"/>
+        <a:font script="Taml" typeface="Latha"/>
+        <a:font script="Syrc" typeface="Estrangelo Edessa"/>
+        <a:font script="Orya" typeface="Kalinga"/>
+        <a:font script="Mlym" typeface="Kartika"/>
+        <a:font script="Laoo" typeface="DokChampa"/>
+        <a:font script="Sinh" typeface="Iskoola Pota"/>
+        <a:font script="Mong" typeface="Mongolian Baiti"/>
+        <a:font script="Viet" typeface="Times New Roman"/>
+        <a:font script="Uigh" typeface="Microsoft Uighur"/>
+        <a:font script="Geor" typeface="Sylfaen"/>
+        <a:font script="Armn" typeface="Arial"/>
+        <a:font script="Bugi" typeface="Leelawadee UI"/>
+        <a:font script="Bopo" typeface="Microsoft JhengHei"/>
+        <a:font script="Java" typeface="Javanese Text"/>
+        <a:font script="Lisu" typeface="Segoe UI"/>
+        <a:font script="Mymr" typeface="Myanmar Text"/>
+        <a:font script="Nkoo" typeface="Ebrima"/>
+        <a:font script="Olck" typeface="Nirmala UI"/>
+        <a:font script="Osma" typeface="Ebrima"/>
+        <a:font script="Phag" typeface="Phagspa"/>
+        <a:font script="Syrn" typeface="Estrangelo Edessa"/>
+        <a:font script="Syrj" typeface="Estrangelo Edessa"/>
+        <a:font script="Syre" typeface="Estrangelo Edessa"/>
+        <a:font script="Sora" typeface="Nirmala UI"/>
+        <a:font script="Tale" typeface="Microsoft Tai Le"/>
+        <a:font script="Talu" typeface="Microsoft New Tai Lue"/>
+        <a:font script="Tfng" typeface="Ebrima"/>
+      </a:majorFont>
+      <a:minorFont>
+        <a:latin typeface="Calibri" panose="020F0502020204030204"/>
+        <a:ea typeface=""/>
+        <a:cs typeface=""/>
+        <a:font script="Jpan" typeface="游ゴシック"/>
+        <a:font script="Hang" typeface="맑은 고딕"/>
+        <a:font script="Hans" typeface="等线"/>
+        <a:font script="Hant" typeface="新細明體"/>
+        <a:font script="Arab" typeface="Arial"/>
+        <a:font script="Hebr" typeface="Arial"/>
+        <a:font script="Thai" typeface="Cordia New"/>
+        <a:font script="Ethi" typeface="Nyala"/>
+        <a:font script="Beng" typeface="Vrinda"/>
+        <a:font script="Gujr" typeface="Shruti"/>
+        <a:font script="Khmr" typeface="DaunPenh"/>
+        <a:font script="Knda" typeface="Tunga"/>
+        <a:font script="Guru" typeface="Raavi"/>
+        <a:font script="Cans" typeface="Euphemia"/>
+        <a:font script="Cher" typeface="Plantagenet Cherokee"/>
+        <a:font script="Yiii" typeface="Microsoft Yi Baiti"/>
+        <a:font script="Tibt" typeface="Microsoft Himalaya"/>
+        <a:font script="Thaa" typeface="MV Boli"/>
+        <a:font script="Deva" typeface="Mangal"/>
+        <a:font script="Telu" typeface="Gautami"/>
+        <a:font script="Taml" typeface="Latha"/>
+        <a:font script="Syrc" typeface="Estrangelo Edessa"/>
+        <a:font script="Orya" typeface="Kalinga"/>
+        <a:font script="Mlym" typeface="Kartika"/>
+        <a:font script="Laoo" typeface="DokChampa"/>
+        <a:font script="Sinh" typeface="Iskoola Pota"/>
+        <a:font script="Mong" typeface="Mongolian Baiti"/>
+        <a:font script="Viet" typeface="Arial"/>
+        <a:font script="Uigh" typeface="Microsoft Uighur"/>
+        <a:font script="Geor" typeface="Sylfaen"/>
+        <a:font script="Armn" typeface="Arial"/>
+        <a:font script="Bugi" typeface="Leelawadee UI"/>
+        <a:font script="Bopo" typeface="Microsoft JhengHei"/>
+        <a:font script="Java" typeface="Javanese Text"/>
+        <a:font script="Lisu" typeface="Segoe UI"/>
+        <a:font script="Mymr" typeface="Myanmar Text"/>
+        <a:font script="Nkoo" typeface="Ebrima"/>
+        <a:font script="Olck" typeface="Nirmala UI"/>
+        <a:font script="Osma" typeface="Ebrima"/>
+        <a:font script="Phag" typeface="Phagspa"/>
+        <a:font script="Syrn" typeface="Estrangelo Edessa"/>
+        <a:font script="Syrj" typeface="Estrangelo Edessa"/>
+        <a:font script="Syre" typeface="Estrangelo Edessa"/>
+        <a:font script="Sora" typeface="Nirmala UI"/>
+        <a:font script="Tale" typeface="Microsoft Tai Le"/>
+        <a:font script="Talu" typeface="Microsoft New Tai Lue"/>
+        <a:font script="Tfng" typeface="Ebrima"/>
+      </a:minorFont>
+    </a:fontScheme>
+    <a:fmtScheme name="Office">
+      <a:fillStyleLst>
+        <a:solidFill>
+          <a:schemeClr val="phClr"/>
+        </a:solidFill>
+        <a:gradFill rotWithShape="1">
+          <a:gsLst>
+            <a:gs pos="0">
+              <a:schemeClr val="phClr">
+                <a:lumMod val="110000"/>
+                <a:satMod val="105000"/>
+                <a:tint val="67000"/>
+              </a:schemeClr>
+            </a:gs>
+            <a:gs pos="50000">
+              <a:schemeClr val="phClr">
+                <a:lumMod val="105000"/>
+                <a:satMod val="103000"/>
+                <a:tint val="73000"/>
+              </a:schemeClr>
+            </a:gs>
+            <a:gs pos="100000">
+              <a:schemeClr val="phClr">
+                <a:lumMod val="105000"/>
+                <a:satMod val="109000"/>
+                <a:tint val="81000"/>
+              </a:schemeClr>
+            </a:gs>
+          </a:gsLst>
+          <a:lin ang="5400000" scaled="0"/>
+        </a:gradFill>
+        <a:gradFill rotWithShape="1">
+          <a:gsLst>
+            <a:gs pos="0">
+              <a:schemeClr val="phClr">
+                <a:satMod val="103000"/>
+                <a:lumMod val="102000"/>
+                <a:tint val="94000"/>
+              </a:schemeClr>
+            </a:gs>
+            <a:gs pos="50000">
+              <a:schemeClr val="phClr">
+                <a:satMod val="110000"/>
+                <a:lumMod val="100000"/>
+                <a:shade val="100000"/>
+              </a:schemeClr>
+            </a:gs>
+            <a:gs pos="100000">
+              <a:schemeClr val="phClr">
+                <a:lumMod val="99000"/>
+                <a:satMod val="120000"/>
+                <a:shade val="78000"/>
+              </a:schemeClr>
+            </a:gs>
+          </a:gsLst>
+          <a:lin ang="5400000" scaled="0"/>
+        </a:gradFill>
+      </a:fillStyleLst>
+      <a:lnStyleLst>
+        <a:ln w="6350" cap="flat" cmpd="sng" algn="ctr">
+          <a:solidFill>
+            <a:schemeClr val="phClr"/>
+          </a:solidFill>
+          <a:prstDash val="solid"/>
+          <a:miter lim="800000"/>
+        </a:ln>
+        <a:ln w="12700" cap="flat" cmpd="sng" algn="ctr">
+          <a:solidFill>
+            <a:schemeClr val="phClr"/>
+          </a:solidFill>
+          <a:prstDash val="solid"/>
+          <a:miter lim="800000"/>
+        </a:ln>
+        <a:ln w="19050" cap="flat" cmpd="sng" algn="ctr">
+          <a:solidFill>
+            <a:schemeClr val="phClr"/>
+          </a:solidFill>
+          <a:prstDash val="solid"/>
+          <a:miter lim="800000"/>
+        </a:ln>
+      </a:lnStyleLst>
+      <a:effectStyleLst>
+        <a:effectStyle>
+          <a:effectLst/>
+        </a:effectStyle>
+        <a:effectStyle>
+          <a:effectLst/>
+        </a:effectStyle>
+        <a:effectStyle>
+          <a:effectLst>
+            <a:outerShdw blurRad="57150" dist="19050" dir="5400000" algn="ctr" rotWithShape="0">
+              <a:srgbClr val="000000">
+                <a:alpha val="63000"/>
+              </a:srgbClr>
+            </a:outerShdw>
+          </a:effectLst>
+        </a:effectStyle>
+      </a:effectStyleLst>
+      <a:bgFillStyleLst>
+        <a:solidFill>
+          <a:schemeClr val="phClr"/>
+        </a:solidFill>
+        <a:solidFill>
+          <a:schemeClr val="phClr">
+            <a:tint val="95000"/>
+            <a:satMod val="170000"/>
+          </a:schemeClr>
+        </a:solidFill>
+        <a:gradFill rotWithShape="1">
+          <a:gsLst>
+            <a:gs pos="0">
+              <a:schemeClr val="phClr">
+                <a:tint val="93000"/>
+                <a:satMod val="150000"/>
+                <a:shade val="98000"/>
+                <a:lumMod val="102000"/>
+              </a:schemeClr>
+            </a:gs>
+            <a:gs pos="50000">
+              <a:schemeClr val="phClr">
+                <a:tint val="98000"/>
+                <a:satMod val="130000"/>
+                <a:shade val="90000"/>
+                <a:lumMod val="103000"/>
+              </a:schemeClr>
+            </a:gs>
+            <a:gs pos="100000">
+              <a:schemeClr val="phClr">
+                <a:shade val="63000"/>
+                <a:satMod val="120000"/>
+              </a:schemeClr>
+            </a:gs>
+          </a:gsLst>
+          <a:lin ang="5400000" scaled="0"/>
+        </a:gradFill>
+      </a:bgFillStyleLst>
+    </a:fmtScheme>
+  </a:themeElements>
+  <a:objectDefaults/>
+  <a:extraClrSchemeLst/>
+  <a:extLst>
+    <a:ext uri="{05A4C25C-085E-4340-85A3-A5531E510DB2}">
+      <thm15:themeFamily xmlns:thm15="http://schemas.microsoft.com/office/thememl/2012/main" name="Office Theme" id="{62F939B6-93AF-4DB8-9C6B-D6C7DFDC589F}" vid="{4A3C46E8-61CC-4603-A589-7422A47A8E4A}"/>
+    </a:ext>
+  </a:extLst>
+</a:theme>
 </file>
</xml_diff>